<commit_message>
One section was deleted form the ppt
</commit_message>
<xml_diff>
--- a/Documentations/NasaPC_WebShopProject FRONTEND.pptx
+++ b/Documentations/NasaPC_WebShopProject FRONTEND.pptx
@@ -5,7 +5,7 @@
     <p:sldMasterId id="2147483660" r:id="rId1"/>
   </p:sldMasterIdLst>
   <p:notesMasterIdLst>
-    <p:notesMasterId r:id="rId10"/>
+    <p:notesMasterId r:id="rId9"/>
   </p:notesMasterIdLst>
   <p:sldIdLst>
     <p:sldId id="257" r:id="rId2"/>
@@ -15,7 +15,6 @@
     <p:sldId id="263" r:id="rId6"/>
     <p:sldId id="269" r:id="rId7"/>
     <p:sldId id="273" r:id="rId8"/>
-    <p:sldId id="278" r:id="rId9"/>
   </p:sldIdLst>
   <p:sldSz cx="12192000" cy="6858000"/>
   <p:notesSz cx="6858000" cy="9144000"/>
@@ -4451,114 +4450,6 @@
               <a:buChar char="v"/>
               <a:defRPr/>
             </a:pPr>
-            <a:r>
-              <a:rPr lang="hu-HU" sz="1800" dirty="0" err="1">
-                <a:solidFill>
-                  <a:schemeClr val="tx1">
-                    <a:lumMod val="75000"/>
-                    <a:lumOff val="25000"/>
-                  </a:schemeClr>
-                </a:solidFill>
-                <a:latin typeface="Arial" panose="020B0604020202020204" pitchFamily="34" charset="0"/>
-                <a:cs typeface="Arial" panose="020B0604020202020204" pitchFamily="34" charset="0"/>
-              </a:rPr>
-              <a:t>Unused</a:t>
-            </a:r>
-            <a:r>
-              <a:rPr lang="hu-HU" sz="1800" dirty="0">
-                <a:solidFill>
-                  <a:schemeClr val="tx1">
-                    <a:lumMod val="75000"/>
-                    <a:lumOff val="25000"/>
-                  </a:schemeClr>
-                </a:solidFill>
-                <a:latin typeface="Arial" panose="020B0604020202020204" pitchFamily="34" charset="0"/>
-                <a:cs typeface="Arial" panose="020B0604020202020204" pitchFamily="34" charset="0"/>
-              </a:rPr>
-              <a:t> </a:t>
-            </a:r>
-            <a:r>
-              <a:rPr lang="hu-HU" sz="1800" dirty="0" err="1">
-                <a:solidFill>
-                  <a:schemeClr val="tx1">
-                    <a:lumMod val="75000"/>
-                    <a:lumOff val="25000"/>
-                  </a:schemeClr>
-                </a:solidFill>
-                <a:latin typeface="Arial" panose="020B0604020202020204" pitchFamily="34" charset="0"/>
-                <a:cs typeface="Arial" panose="020B0604020202020204" pitchFamily="34" charset="0"/>
-              </a:rPr>
-              <a:t>content</a:t>
-            </a:r>
-            <a:r>
-              <a:rPr lang="hu-HU" sz="1800" dirty="0">
-                <a:solidFill>
-                  <a:schemeClr val="tx1">
-                    <a:lumMod val="75000"/>
-                    <a:lumOff val="25000"/>
-                  </a:schemeClr>
-                </a:solidFill>
-                <a:latin typeface="Arial" panose="020B0604020202020204" pitchFamily="34" charset="0"/>
-                <a:cs typeface="Arial" panose="020B0604020202020204" pitchFamily="34" charset="0"/>
-              </a:rPr>
-              <a:t> and </a:t>
-            </a:r>
-            <a:r>
-              <a:rPr lang="hu-HU" sz="1800" dirty="0" err="1">
-                <a:solidFill>
-                  <a:schemeClr val="tx1">
-                    <a:lumMod val="75000"/>
-                    <a:lumOff val="25000"/>
-                  </a:schemeClr>
-                </a:solidFill>
-                <a:latin typeface="Arial" panose="020B0604020202020204" pitchFamily="34" charset="0"/>
-                <a:cs typeface="Arial" panose="020B0604020202020204" pitchFamily="34" charset="0"/>
-              </a:rPr>
-              <a:t>future</a:t>
-            </a:r>
-            <a:r>
-              <a:rPr lang="hu-HU" sz="1800" dirty="0">
-                <a:solidFill>
-                  <a:schemeClr val="tx1">
-                    <a:lumMod val="75000"/>
-                    <a:lumOff val="25000"/>
-                  </a:schemeClr>
-                </a:solidFill>
-                <a:latin typeface="Arial" panose="020B0604020202020204" pitchFamily="34" charset="0"/>
-                <a:cs typeface="Arial" panose="020B0604020202020204" pitchFamily="34" charset="0"/>
-              </a:rPr>
-              <a:t> </a:t>
-            </a:r>
-            <a:r>
-              <a:rPr lang="hu-HU" sz="1800" dirty="0" err="1">
-                <a:solidFill>
-                  <a:schemeClr val="tx1">
-                    <a:lumMod val="75000"/>
-                    <a:lumOff val="25000"/>
-                  </a:schemeClr>
-                </a:solidFill>
-                <a:latin typeface="Arial" panose="020B0604020202020204" pitchFamily="34" charset="0"/>
-                <a:cs typeface="Arial" panose="020B0604020202020204" pitchFamily="34" charset="0"/>
-              </a:rPr>
-              <a:t>plans</a:t>
-            </a:r>
-            <a:endParaRPr lang="en-GB" sz="1800" dirty="0">
-              <a:solidFill>
-                <a:schemeClr val="tx1">
-                  <a:lumMod val="75000"/>
-                  <a:lumOff val="25000"/>
-                </a:schemeClr>
-              </a:solidFill>
-              <a:latin typeface="Arial" panose="020B0604020202020204" pitchFamily="34" charset="0"/>
-              <a:cs typeface="Arial" panose="020B0604020202020204" pitchFamily="34" charset="0"/>
-            </a:endParaRPr>
-          </a:p>
-          <a:p>
-            <a:pPr lvl="1">
-              <a:buFont typeface="Wingdings" pitchFamily="2" charset="2"/>
-              <a:buChar char="v"/>
-              <a:defRPr/>
-            </a:pPr>
             <a:endParaRPr lang="en-GB" sz="1600" dirty="0">
               <a:solidFill>
                 <a:schemeClr val="tx1">
@@ -7774,637 +7665,6 @@
     <p:extLst>
       <p:ext uri="{BB962C8B-B14F-4D97-AF65-F5344CB8AC3E}">
         <p14:creationId xmlns:p14="http://schemas.microsoft.com/office/powerpoint/2010/main" val="3977099431"/>
-      </p:ext>
-    </p:extLst>
-  </p:cSld>
-  <p:clrMapOvr>
-    <a:masterClrMapping/>
-  </p:clrMapOvr>
-</p:sld>
-</file>
-
-<file path=ppt/slides/slide8.xml><?xml version="1.0" encoding="utf-8"?>
-<p:sld xmlns:a="http://schemas.openxmlformats.org/drawingml/2006/main" xmlns:r="http://schemas.openxmlformats.org/officeDocument/2006/relationships" xmlns:p="http://schemas.openxmlformats.org/presentationml/2006/main">
-  <p:cSld>
-    <p:spTree>
-      <p:nvGrpSpPr>
-        <p:cNvPr id="1" name=""/>
-        <p:cNvGrpSpPr/>
-        <p:nvPr/>
-      </p:nvGrpSpPr>
-      <p:grpSpPr>
-        <a:xfrm>
-          <a:off x="0" y="0"/>
-          <a:ext cx="0" cy="0"/>
-          <a:chOff x="0" y="0"/>
-          <a:chExt cx="0" cy="0"/>
-        </a:xfrm>
-      </p:grpSpPr>
-      <p:sp>
-        <p:nvSpPr>
-          <p:cNvPr id="2" name="Cím 1">
-            <a:extLst>
-              <a:ext uri="{FF2B5EF4-FFF2-40B4-BE49-F238E27FC236}">
-                <a16:creationId xmlns:a16="http://schemas.microsoft.com/office/drawing/2014/main" id="{C37C21C9-7C9C-4C95-BE06-301051055663}"/>
-              </a:ext>
-            </a:extLst>
-          </p:cNvPr>
-          <p:cNvSpPr>
-            <a:spLocks noGrp="1"/>
-          </p:cNvSpPr>
-          <p:nvPr>
-            <p:ph type="ctrTitle"/>
-          </p:nvPr>
-        </p:nvSpPr>
-        <p:spPr>
-          <a:xfrm>
-            <a:off x="1524000" y="67286"/>
-            <a:ext cx="9144000" cy="847114"/>
-          </a:xfrm>
-          <a:ln>
-            <a:noFill/>
-          </a:ln>
-        </p:spPr>
-        <p:txBody>
-          <a:bodyPr anchor="ctr">
-            <a:normAutofit/>
-          </a:bodyPr>
-          <a:lstStyle/>
-          <a:p>
-            <a:pPr lvl="1">
-              <a:defRPr/>
-            </a:pPr>
-            <a:r>
-              <a:rPr lang="hu-HU" sz="4000" dirty="0">
-                <a:solidFill>
-                  <a:schemeClr val="tx1">
-                    <a:lumMod val="75000"/>
-                    <a:lumOff val="25000"/>
-                  </a:schemeClr>
-                </a:solidFill>
-                <a:latin typeface="Arial" panose="020B0604020202020204" pitchFamily="34" charset="0"/>
-                <a:cs typeface="Arial" panose="020B0604020202020204" pitchFamily="34" charset="0"/>
-              </a:rPr>
-              <a:t>      </a:t>
-            </a:r>
-            <a:r>
-              <a:rPr lang="hu-HU" sz="4000" dirty="0" err="1">
-                <a:solidFill>
-                  <a:schemeClr val="tx1">
-                    <a:lumMod val="75000"/>
-                    <a:lumOff val="25000"/>
-                  </a:schemeClr>
-                </a:solidFill>
-                <a:latin typeface="Arial" panose="020B0604020202020204" pitchFamily="34" charset="0"/>
-                <a:cs typeface="Arial" panose="020B0604020202020204" pitchFamily="34" charset="0"/>
-              </a:rPr>
-              <a:t>Unused</a:t>
-            </a:r>
-            <a:r>
-              <a:rPr lang="hu-HU" sz="4000" dirty="0">
-                <a:solidFill>
-                  <a:schemeClr val="tx1">
-                    <a:lumMod val="75000"/>
-                    <a:lumOff val="25000"/>
-                  </a:schemeClr>
-                </a:solidFill>
-                <a:latin typeface="Arial" panose="020B0604020202020204" pitchFamily="34" charset="0"/>
-                <a:cs typeface="Arial" panose="020B0604020202020204" pitchFamily="34" charset="0"/>
-              </a:rPr>
-              <a:t> </a:t>
-            </a:r>
-            <a:r>
-              <a:rPr lang="hu-HU" sz="4000" dirty="0" err="1">
-                <a:solidFill>
-                  <a:schemeClr val="tx1">
-                    <a:lumMod val="75000"/>
-                    <a:lumOff val="25000"/>
-                  </a:schemeClr>
-                </a:solidFill>
-                <a:latin typeface="Arial" panose="020B0604020202020204" pitchFamily="34" charset="0"/>
-                <a:cs typeface="Arial" panose="020B0604020202020204" pitchFamily="34" charset="0"/>
-              </a:rPr>
-              <a:t>content</a:t>
-            </a:r>
-            <a:r>
-              <a:rPr lang="hu-HU" sz="4000" dirty="0">
-                <a:solidFill>
-                  <a:schemeClr val="tx1">
-                    <a:lumMod val="75000"/>
-                    <a:lumOff val="25000"/>
-                  </a:schemeClr>
-                </a:solidFill>
-                <a:latin typeface="Arial" panose="020B0604020202020204" pitchFamily="34" charset="0"/>
-                <a:cs typeface="Arial" panose="020B0604020202020204" pitchFamily="34" charset="0"/>
-              </a:rPr>
-              <a:t> and </a:t>
-            </a:r>
-            <a:r>
-              <a:rPr lang="hu-HU" sz="4000" dirty="0" err="1">
-                <a:solidFill>
-                  <a:schemeClr val="tx1">
-                    <a:lumMod val="75000"/>
-                    <a:lumOff val="25000"/>
-                  </a:schemeClr>
-                </a:solidFill>
-                <a:latin typeface="Arial" panose="020B0604020202020204" pitchFamily="34" charset="0"/>
-                <a:cs typeface="Arial" panose="020B0604020202020204" pitchFamily="34" charset="0"/>
-              </a:rPr>
-              <a:t>future</a:t>
-            </a:r>
-            <a:r>
-              <a:rPr lang="hu-HU" sz="4000" dirty="0">
-                <a:solidFill>
-                  <a:schemeClr val="tx1">
-                    <a:lumMod val="75000"/>
-                    <a:lumOff val="25000"/>
-                  </a:schemeClr>
-                </a:solidFill>
-                <a:latin typeface="Arial" panose="020B0604020202020204" pitchFamily="34" charset="0"/>
-                <a:cs typeface="Arial" panose="020B0604020202020204" pitchFamily="34" charset="0"/>
-              </a:rPr>
-              <a:t> </a:t>
-            </a:r>
-            <a:r>
-              <a:rPr lang="hu-HU" sz="4000" dirty="0" err="1">
-                <a:solidFill>
-                  <a:schemeClr val="tx1">
-                    <a:lumMod val="75000"/>
-                    <a:lumOff val="25000"/>
-                  </a:schemeClr>
-                </a:solidFill>
-                <a:latin typeface="Arial" panose="020B0604020202020204" pitchFamily="34" charset="0"/>
-                <a:cs typeface="Arial" panose="020B0604020202020204" pitchFamily="34" charset="0"/>
-              </a:rPr>
-              <a:t>plans</a:t>
-            </a:r>
-            <a:endParaRPr lang="en-GB" sz="4000" dirty="0">
-              <a:solidFill>
-                <a:schemeClr val="tx1">
-                  <a:lumMod val="75000"/>
-                  <a:lumOff val="25000"/>
-                </a:schemeClr>
-              </a:solidFill>
-              <a:latin typeface="Arial" panose="020B0604020202020204" pitchFamily="34" charset="0"/>
-              <a:cs typeface="Arial" panose="020B0604020202020204" pitchFamily="34" charset="0"/>
-            </a:endParaRPr>
-          </a:p>
-        </p:txBody>
-      </p:sp>
-      <p:cxnSp>
-        <p:nvCxnSpPr>
-          <p:cNvPr id="5" name="Egyenes összekötő 4">
-            <a:extLst>
-              <a:ext uri="{FF2B5EF4-FFF2-40B4-BE49-F238E27FC236}">
-                <a16:creationId xmlns:a16="http://schemas.microsoft.com/office/drawing/2014/main" id="{67B72B84-2E81-4645-92BA-59A24301A3AF}"/>
-              </a:ext>
-            </a:extLst>
-          </p:cNvPr>
-          <p:cNvCxnSpPr>
-            <a:cxnSpLocks/>
-          </p:cNvCxnSpPr>
-          <p:nvPr/>
-        </p:nvCxnSpPr>
-        <p:spPr>
-          <a:xfrm>
-            <a:off x="3167406" y="914400"/>
-            <a:ext cx="5863472" cy="0"/>
-          </a:xfrm>
-          <a:prstGeom prst="line">
-            <a:avLst/>
-          </a:prstGeom>
-          <a:ln w="25400">
-            <a:solidFill>
-              <a:schemeClr val="tx1">
-                <a:lumMod val="50000"/>
-                <a:lumOff val="50000"/>
-              </a:schemeClr>
-            </a:solidFill>
-          </a:ln>
-        </p:spPr>
-        <p:style>
-          <a:lnRef idx="1">
-            <a:schemeClr val="accent1"/>
-          </a:lnRef>
-          <a:fillRef idx="0">
-            <a:schemeClr val="accent1"/>
-          </a:fillRef>
-          <a:effectRef idx="0">
-            <a:schemeClr val="accent1"/>
-          </a:effectRef>
-          <a:fontRef idx="minor">
-            <a:schemeClr val="tx1"/>
-          </a:fontRef>
-        </p:style>
-      </p:cxnSp>
-      <p:sp>
-        <p:nvSpPr>
-          <p:cNvPr id="43" name="Alcím 2">
-            <a:extLst>
-              <a:ext uri="{FF2B5EF4-FFF2-40B4-BE49-F238E27FC236}">
-                <a16:creationId xmlns:a16="http://schemas.microsoft.com/office/drawing/2014/main" id="{1A35DD48-FDD0-4725-ACD4-2E71CF14623F}"/>
-              </a:ext>
-            </a:extLst>
-          </p:cNvPr>
-          <p:cNvSpPr txBox="1">
-            <a:spLocks/>
-          </p:cNvSpPr>
-          <p:nvPr/>
-        </p:nvSpPr>
-        <p:spPr>
-          <a:xfrm>
-            <a:off x="1912315" y="914400"/>
-            <a:ext cx="7948269" cy="545352"/>
-          </a:xfrm>
-          <a:prstGeom prst="rect">
-            <a:avLst/>
-          </a:prstGeom>
-        </p:spPr>
-        <p:txBody>
-          <a:bodyPr vert="horz" lIns="91440" tIns="45720" rIns="91440" bIns="45720" rtlCol="0">
-            <a:normAutofit lnSpcReduction="10000"/>
-          </a:bodyPr>
-          <a:lstStyle>
-            <a:lvl1pPr marL="0" indent="0" algn="ctr" defTabSz="914400" rtl="0" eaLnBrk="1" latinLnBrk="0" hangingPunct="1">
-              <a:lnSpc>
-                <a:spcPct val="90000"/>
-              </a:lnSpc>
-              <a:spcBef>
-                <a:spcPts val="1000"/>
-              </a:spcBef>
-              <a:buFont typeface="Arial" panose="020B0604020202020204" pitchFamily="34" charset="0"/>
-              <a:buNone/>
-              <a:defRPr sz="2400" kern="1200">
-                <a:solidFill>
-                  <a:schemeClr val="tx1"/>
-                </a:solidFill>
-                <a:latin typeface="+mn-lt"/>
-                <a:ea typeface="+mn-ea"/>
-                <a:cs typeface="+mn-cs"/>
-              </a:defRPr>
-            </a:lvl1pPr>
-            <a:lvl2pPr marL="457200" indent="0" algn="ctr" defTabSz="914400" rtl="0" eaLnBrk="1" latinLnBrk="0" hangingPunct="1">
-              <a:lnSpc>
-                <a:spcPct val="90000"/>
-              </a:lnSpc>
-              <a:spcBef>
-                <a:spcPts val="500"/>
-              </a:spcBef>
-              <a:buFont typeface="Arial" panose="020B0604020202020204" pitchFamily="34" charset="0"/>
-              <a:buNone/>
-              <a:defRPr sz="2000" kern="1200">
-                <a:solidFill>
-                  <a:schemeClr val="tx1"/>
-                </a:solidFill>
-                <a:latin typeface="+mn-lt"/>
-                <a:ea typeface="+mn-ea"/>
-                <a:cs typeface="+mn-cs"/>
-              </a:defRPr>
-            </a:lvl2pPr>
-            <a:lvl3pPr marL="914400" indent="0" algn="ctr" defTabSz="914400" rtl="0" eaLnBrk="1" latinLnBrk="0" hangingPunct="1">
-              <a:lnSpc>
-                <a:spcPct val="90000"/>
-              </a:lnSpc>
-              <a:spcBef>
-                <a:spcPts val="500"/>
-              </a:spcBef>
-              <a:buFont typeface="Arial" panose="020B0604020202020204" pitchFamily="34" charset="0"/>
-              <a:buNone/>
-              <a:defRPr sz="1800" kern="1200">
-                <a:solidFill>
-                  <a:schemeClr val="tx1"/>
-                </a:solidFill>
-                <a:latin typeface="+mn-lt"/>
-                <a:ea typeface="+mn-ea"/>
-                <a:cs typeface="+mn-cs"/>
-              </a:defRPr>
-            </a:lvl3pPr>
-            <a:lvl4pPr marL="1371600" indent="0" algn="ctr" defTabSz="914400" rtl="0" eaLnBrk="1" latinLnBrk="0" hangingPunct="1">
-              <a:lnSpc>
-                <a:spcPct val="90000"/>
-              </a:lnSpc>
-              <a:spcBef>
-                <a:spcPts val="500"/>
-              </a:spcBef>
-              <a:buFont typeface="Arial" panose="020B0604020202020204" pitchFamily="34" charset="0"/>
-              <a:buNone/>
-              <a:defRPr sz="1600" kern="1200">
-                <a:solidFill>
-                  <a:schemeClr val="tx1"/>
-                </a:solidFill>
-                <a:latin typeface="+mn-lt"/>
-                <a:ea typeface="+mn-ea"/>
-                <a:cs typeface="+mn-cs"/>
-              </a:defRPr>
-            </a:lvl4pPr>
-            <a:lvl5pPr marL="1828800" indent="0" algn="ctr" defTabSz="914400" rtl="0" eaLnBrk="1" latinLnBrk="0" hangingPunct="1">
-              <a:lnSpc>
-                <a:spcPct val="90000"/>
-              </a:lnSpc>
-              <a:spcBef>
-                <a:spcPts val="500"/>
-              </a:spcBef>
-              <a:buFont typeface="Arial" panose="020B0604020202020204" pitchFamily="34" charset="0"/>
-              <a:buNone/>
-              <a:defRPr sz="1600" kern="1200">
-                <a:solidFill>
-                  <a:schemeClr val="tx1"/>
-                </a:solidFill>
-                <a:latin typeface="+mn-lt"/>
-                <a:ea typeface="+mn-ea"/>
-                <a:cs typeface="+mn-cs"/>
-              </a:defRPr>
-            </a:lvl5pPr>
-            <a:lvl6pPr marL="2286000" indent="0" algn="ctr" defTabSz="914400" rtl="0" eaLnBrk="1" latinLnBrk="0" hangingPunct="1">
-              <a:lnSpc>
-                <a:spcPct val="90000"/>
-              </a:lnSpc>
-              <a:spcBef>
-                <a:spcPts val="500"/>
-              </a:spcBef>
-              <a:buFont typeface="Arial" panose="020B0604020202020204" pitchFamily="34" charset="0"/>
-              <a:buNone/>
-              <a:defRPr sz="1600" kern="1200">
-                <a:solidFill>
-                  <a:schemeClr val="tx1"/>
-                </a:solidFill>
-                <a:latin typeface="+mn-lt"/>
-                <a:ea typeface="+mn-ea"/>
-                <a:cs typeface="+mn-cs"/>
-              </a:defRPr>
-            </a:lvl6pPr>
-            <a:lvl7pPr marL="2743200" indent="0" algn="ctr" defTabSz="914400" rtl="0" eaLnBrk="1" latinLnBrk="0" hangingPunct="1">
-              <a:lnSpc>
-                <a:spcPct val="90000"/>
-              </a:lnSpc>
-              <a:spcBef>
-                <a:spcPts val="500"/>
-              </a:spcBef>
-              <a:buFont typeface="Arial" panose="020B0604020202020204" pitchFamily="34" charset="0"/>
-              <a:buNone/>
-              <a:defRPr sz="1600" kern="1200">
-                <a:solidFill>
-                  <a:schemeClr val="tx1"/>
-                </a:solidFill>
-                <a:latin typeface="+mn-lt"/>
-                <a:ea typeface="+mn-ea"/>
-                <a:cs typeface="+mn-cs"/>
-              </a:defRPr>
-            </a:lvl7pPr>
-            <a:lvl8pPr marL="3200400" indent="0" algn="ctr" defTabSz="914400" rtl="0" eaLnBrk="1" latinLnBrk="0" hangingPunct="1">
-              <a:lnSpc>
-                <a:spcPct val="90000"/>
-              </a:lnSpc>
-              <a:spcBef>
-                <a:spcPts val="500"/>
-              </a:spcBef>
-              <a:buFont typeface="Arial" panose="020B0604020202020204" pitchFamily="34" charset="0"/>
-              <a:buNone/>
-              <a:defRPr sz="1600" kern="1200">
-                <a:solidFill>
-                  <a:schemeClr val="tx1"/>
-                </a:solidFill>
-                <a:latin typeface="+mn-lt"/>
-                <a:ea typeface="+mn-ea"/>
-                <a:cs typeface="+mn-cs"/>
-              </a:defRPr>
-            </a:lvl8pPr>
-            <a:lvl9pPr marL="3657600" indent="0" algn="ctr" defTabSz="914400" rtl="0" eaLnBrk="1" latinLnBrk="0" hangingPunct="1">
-              <a:lnSpc>
-                <a:spcPct val="90000"/>
-              </a:lnSpc>
-              <a:spcBef>
-                <a:spcPts val="500"/>
-              </a:spcBef>
-              <a:buFont typeface="Arial" panose="020B0604020202020204" pitchFamily="34" charset="0"/>
-              <a:buNone/>
-              <a:defRPr sz="1600" kern="1200">
-                <a:solidFill>
-                  <a:schemeClr val="tx1"/>
-                </a:solidFill>
-                <a:latin typeface="+mn-lt"/>
-                <a:ea typeface="+mn-ea"/>
-                <a:cs typeface="+mn-cs"/>
-              </a:defRPr>
-            </a:lvl9pPr>
-          </a:lstStyle>
-          <a:p>
-            <a:pPr lvl="1">
-              <a:defRPr/>
-            </a:pPr>
-            <a:endParaRPr lang="en-GB" sz="3600" dirty="0">
-              <a:solidFill>
-                <a:schemeClr val="tx1">
-                  <a:lumMod val="75000"/>
-                  <a:lumOff val="25000"/>
-                </a:schemeClr>
-              </a:solidFill>
-              <a:latin typeface="Arial" panose="020B0604020202020204" pitchFamily="34" charset="0"/>
-              <a:cs typeface="Arial" panose="020B0604020202020204" pitchFamily="34" charset="0"/>
-            </a:endParaRPr>
-          </a:p>
-        </p:txBody>
-      </p:sp>
-      <p:sp>
-        <p:nvSpPr>
-          <p:cNvPr id="44" name="Alcím 2">
-            <a:extLst>
-              <a:ext uri="{FF2B5EF4-FFF2-40B4-BE49-F238E27FC236}">
-                <a16:creationId xmlns:a16="http://schemas.microsoft.com/office/drawing/2014/main" id="{B529E595-0264-4673-BB61-B5462F194C19}"/>
-              </a:ext>
-            </a:extLst>
-          </p:cNvPr>
-          <p:cNvSpPr txBox="1">
-            <a:spLocks/>
-          </p:cNvSpPr>
-          <p:nvPr/>
-        </p:nvSpPr>
-        <p:spPr>
-          <a:xfrm>
-            <a:off x="1524000" y="1335738"/>
-            <a:ext cx="9144000" cy="398888"/>
-          </a:xfrm>
-          <a:prstGeom prst="rect">
-            <a:avLst/>
-          </a:prstGeom>
-        </p:spPr>
-        <p:txBody>
-          <a:bodyPr vert="horz" lIns="91440" tIns="45720" rIns="91440" bIns="45720" rtlCol="0">
-            <a:normAutofit lnSpcReduction="10000"/>
-          </a:bodyPr>
-          <a:lstStyle>
-            <a:lvl1pPr marL="0" indent="0" algn="ctr" defTabSz="914400" rtl="0" eaLnBrk="1" latinLnBrk="0" hangingPunct="1">
-              <a:lnSpc>
-                <a:spcPct val="90000"/>
-              </a:lnSpc>
-              <a:spcBef>
-                <a:spcPts val="1000"/>
-              </a:spcBef>
-              <a:buFont typeface="Arial" panose="020B0604020202020204" pitchFamily="34" charset="0"/>
-              <a:buNone/>
-              <a:defRPr sz="2400" kern="1200">
-                <a:solidFill>
-                  <a:schemeClr val="tx1"/>
-                </a:solidFill>
-                <a:latin typeface="+mn-lt"/>
-                <a:ea typeface="+mn-ea"/>
-                <a:cs typeface="+mn-cs"/>
-              </a:defRPr>
-            </a:lvl1pPr>
-            <a:lvl2pPr marL="457200" indent="0" algn="ctr" defTabSz="914400" rtl="0" eaLnBrk="1" latinLnBrk="0" hangingPunct="1">
-              <a:lnSpc>
-                <a:spcPct val="90000"/>
-              </a:lnSpc>
-              <a:spcBef>
-                <a:spcPts val="500"/>
-              </a:spcBef>
-              <a:buFont typeface="Arial" panose="020B0604020202020204" pitchFamily="34" charset="0"/>
-              <a:buNone/>
-              <a:defRPr sz="2000" kern="1200">
-                <a:solidFill>
-                  <a:schemeClr val="tx1"/>
-                </a:solidFill>
-                <a:latin typeface="+mn-lt"/>
-                <a:ea typeface="+mn-ea"/>
-                <a:cs typeface="+mn-cs"/>
-              </a:defRPr>
-            </a:lvl2pPr>
-            <a:lvl3pPr marL="914400" indent="0" algn="ctr" defTabSz="914400" rtl="0" eaLnBrk="1" latinLnBrk="0" hangingPunct="1">
-              <a:lnSpc>
-                <a:spcPct val="90000"/>
-              </a:lnSpc>
-              <a:spcBef>
-                <a:spcPts val="500"/>
-              </a:spcBef>
-              <a:buFont typeface="Arial" panose="020B0604020202020204" pitchFamily="34" charset="0"/>
-              <a:buNone/>
-              <a:defRPr sz="1800" kern="1200">
-                <a:solidFill>
-                  <a:schemeClr val="tx1"/>
-                </a:solidFill>
-                <a:latin typeface="+mn-lt"/>
-                <a:ea typeface="+mn-ea"/>
-                <a:cs typeface="+mn-cs"/>
-              </a:defRPr>
-            </a:lvl3pPr>
-            <a:lvl4pPr marL="1371600" indent="0" algn="ctr" defTabSz="914400" rtl="0" eaLnBrk="1" latinLnBrk="0" hangingPunct="1">
-              <a:lnSpc>
-                <a:spcPct val="90000"/>
-              </a:lnSpc>
-              <a:spcBef>
-                <a:spcPts val="500"/>
-              </a:spcBef>
-              <a:buFont typeface="Arial" panose="020B0604020202020204" pitchFamily="34" charset="0"/>
-              <a:buNone/>
-              <a:defRPr sz="1600" kern="1200">
-                <a:solidFill>
-                  <a:schemeClr val="tx1"/>
-                </a:solidFill>
-                <a:latin typeface="+mn-lt"/>
-                <a:ea typeface="+mn-ea"/>
-                <a:cs typeface="+mn-cs"/>
-              </a:defRPr>
-            </a:lvl4pPr>
-            <a:lvl5pPr marL="1828800" indent="0" algn="ctr" defTabSz="914400" rtl="0" eaLnBrk="1" latinLnBrk="0" hangingPunct="1">
-              <a:lnSpc>
-                <a:spcPct val="90000"/>
-              </a:lnSpc>
-              <a:spcBef>
-                <a:spcPts val="500"/>
-              </a:spcBef>
-              <a:buFont typeface="Arial" panose="020B0604020202020204" pitchFamily="34" charset="0"/>
-              <a:buNone/>
-              <a:defRPr sz="1600" kern="1200">
-                <a:solidFill>
-                  <a:schemeClr val="tx1"/>
-                </a:solidFill>
-                <a:latin typeface="+mn-lt"/>
-                <a:ea typeface="+mn-ea"/>
-                <a:cs typeface="+mn-cs"/>
-              </a:defRPr>
-            </a:lvl5pPr>
-            <a:lvl6pPr marL="2286000" indent="0" algn="ctr" defTabSz="914400" rtl="0" eaLnBrk="1" latinLnBrk="0" hangingPunct="1">
-              <a:lnSpc>
-                <a:spcPct val="90000"/>
-              </a:lnSpc>
-              <a:spcBef>
-                <a:spcPts val="500"/>
-              </a:spcBef>
-              <a:buFont typeface="Arial" panose="020B0604020202020204" pitchFamily="34" charset="0"/>
-              <a:buNone/>
-              <a:defRPr sz="1600" kern="1200">
-                <a:solidFill>
-                  <a:schemeClr val="tx1"/>
-                </a:solidFill>
-                <a:latin typeface="+mn-lt"/>
-                <a:ea typeface="+mn-ea"/>
-                <a:cs typeface="+mn-cs"/>
-              </a:defRPr>
-            </a:lvl6pPr>
-            <a:lvl7pPr marL="2743200" indent="0" algn="ctr" defTabSz="914400" rtl="0" eaLnBrk="1" latinLnBrk="0" hangingPunct="1">
-              <a:lnSpc>
-                <a:spcPct val="90000"/>
-              </a:lnSpc>
-              <a:spcBef>
-                <a:spcPts val="500"/>
-              </a:spcBef>
-              <a:buFont typeface="Arial" panose="020B0604020202020204" pitchFamily="34" charset="0"/>
-              <a:buNone/>
-              <a:defRPr sz="1600" kern="1200">
-                <a:solidFill>
-                  <a:schemeClr val="tx1"/>
-                </a:solidFill>
-                <a:latin typeface="+mn-lt"/>
-                <a:ea typeface="+mn-ea"/>
-                <a:cs typeface="+mn-cs"/>
-              </a:defRPr>
-            </a:lvl7pPr>
-            <a:lvl8pPr marL="3200400" indent="0" algn="ctr" defTabSz="914400" rtl="0" eaLnBrk="1" latinLnBrk="0" hangingPunct="1">
-              <a:lnSpc>
-                <a:spcPct val="90000"/>
-              </a:lnSpc>
-              <a:spcBef>
-                <a:spcPts val="500"/>
-              </a:spcBef>
-              <a:buFont typeface="Arial" panose="020B0604020202020204" pitchFamily="34" charset="0"/>
-              <a:buNone/>
-              <a:defRPr sz="1600" kern="1200">
-                <a:solidFill>
-                  <a:schemeClr val="tx1"/>
-                </a:solidFill>
-                <a:latin typeface="+mn-lt"/>
-                <a:ea typeface="+mn-ea"/>
-                <a:cs typeface="+mn-cs"/>
-              </a:defRPr>
-            </a:lvl8pPr>
-            <a:lvl9pPr marL="3657600" indent="0" algn="ctr" defTabSz="914400" rtl="0" eaLnBrk="1" latinLnBrk="0" hangingPunct="1">
-              <a:lnSpc>
-                <a:spcPct val="90000"/>
-              </a:lnSpc>
-              <a:spcBef>
-                <a:spcPts val="500"/>
-              </a:spcBef>
-              <a:buFont typeface="Arial" panose="020B0604020202020204" pitchFamily="34" charset="0"/>
-              <a:buNone/>
-              <a:defRPr sz="1600" kern="1200">
-                <a:solidFill>
-                  <a:schemeClr val="tx1"/>
-                </a:solidFill>
-                <a:latin typeface="+mn-lt"/>
-                <a:ea typeface="+mn-ea"/>
-                <a:cs typeface="+mn-cs"/>
-              </a:defRPr>
-            </a:lvl9pPr>
-          </a:lstStyle>
-          <a:p>
-            <a:endParaRPr lang="en-GB" dirty="0"/>
-          </a:p>
-        </p:txBody>
-      </p:sp>
-    </p:spTree>
-    <p:extLst>
-      <p:ext uri="{BB962C8B-B14F-4D97-AF65-F5344CB8AC3E}">
-        <p14:creationId xmlns:p14="http://schemas.microsoft.com/office/powerpoint/2010/main" val="3722477728"/>
       </p:ext>
     </p:extLst>
   </p:cSld>

</xml_diff>

<commit_message>
reasoning for the project
</commit_message>
<xml_diff>
--- a/Documentations/NasaPC_WebShopProject FRONTEND.pptx
+++ b/Documentations/NasaPC_WebShopProject FRONTEND.pptx
@@ -5,16 +5,18 @@
     <p:sldMasterId id="2147483660" r:id="rId1"/>
   </p:sldMasterIdLst>
   <p:notesMasterIdLst>
-    <p:notesMasterId r:id="rId9"/>
+    <p:notesMasterId r:id="rId11"/>
   </p:notesMasterIdLst>
   <p:sldIdLst>
     <p:sldId id="257" r:id="rId2"/>
-    <p:sldId id="259" r:id="rId3"/>
-    <p:sldId id="260" r:id="rId4"/>
-    <p:sldId id="261" r:id="rId5"/>
-    <p:sldId id="263" r:id="rId6"/>
-    <p:sldId id="269" r:id="rId7"/>
-    <p:sldId id="273" r:id="rId8"/>
+    <p:sldId id="276" r:id="rId3"/>
+    <p:sldId id="277" r:id="rId4"/>
+    <p:sldId id="259" r:id="rId5"/>
+    <p:sldId id="260" r:id="rId6"/>
+    <p:sldId id="261" r:id="rId7"/>
+    <p:sldId id="263" r:id="rId8"/>
+    <p:sldId id="269" r:id="rId9"/>
+    <p:sldId id="273" r:id="rId10"/>
   </p:sldIdLst>
   <p:sldSz cx="12192000" cy="6858000"/>
   <p:notesSz cx="6858000" cy="9144000"/>
@@ -206,7 +208,7 @@
           <a:p>
             <a:fld id="{D0152BAE-99A8-4C46-A619-8CD90794C8F6}" type="datetimeFigureOut">
               <a:rPr lang="en-GB" smtClean="0"/>
-              <a:t>28/04/2022</a:t>
+              <a:t>29/04/2022</a:t>
             </a:fld>
             <a:endParaRPr lang="en-GB"/>
           </a:p>
@@ -623,7 +625,7 @@
           <a:p>
             <a:fld id="{9403E73E-A2A3-4E22-8402-E10B9D12BA91}" type="datetimeFigureOut">
               <a:rPr lang="en-GB" smtClean="0"/>
-              <a:t>28/04/2022</a:t>
+              <a:t>29/04/2022</a:t>
             </a:fld>
             <a:endParaRPr lang="en-GB"/>
           </a:p>
@@ -823,7 +825,7 @@
           <a:p>
             <a:fld id="{9403E73E-A2A3-4E22-8402-E10B9D12BA91}" type="datetimeFigureOut">
               <a:rPr lang="en-GB" smtClean="0"/>
-              <a:t>28/04/2022</a:t>
+              <a:t>29/04/2022</a:t>
             </a:fld>
             <a:endParaRPr lang="en-GB"/>
           </a:p>
@@ -1033,7 +1035,7 @@
           <a:p>
             <a:fld id="{9403E73E-A2A3-4E22-8402-E10B9D12BA91}" type="datetimeFigureOut">
               <a:rPr lang="en-GB" smtClean="0"/>
-              <a:t>28/04/2022</a:t>
+              <a:t>29/04/2022</a:t>
             </a:fld>
             <a:endParaRPr lang="en-GB"/>
           </a:p>
@@ -1233,7 +1235,7 @@
           <a:p>
             <a:fld id="{9403E73E-A2A3-4E22-8402-E10B9D12BA91}" type="datetimeFigureOut">
               <a:rPr lang="en-GB" smtClean="0"/>
-              <a:t>28/04/2022</a:t>
+              <a:t>29/04/2022</a:t>
             </a:fld>
             <a:endParaRPr lang="en-GB"/>
           </a:p>
@@ -1509,7 +1511,7 @@
           <a:p>
             <a:fld id="{9403E73E-A2A3-4E22-8402-E10B9D12BA91}" type="datetimeFigureOut">
               <a:rPr lang="en-GB" smtClean="0"/>
-              <a:t>28/04/2022</a:t>
+              <a:t>29/04/2022</a:t>
             </a:fld>
             <a:endParaRPr lang="en-GB"/>
           </a:p>
@@ -1777,7 +1779,7 @@
           <a:p>
             <a:fld id="{9403E73E-A2A3-4E22-8402-E10B9D12BA91}" type="datetimeFigureOut">
               <a:rPr lang="en-GB" smtClean="0"/>
-              <a:t>28/04/2022</a:t>
+              <a:t>29/04/2022</a:t>
             </a:fld>
             <a:endParaRPr lang="en-GB"/>
           </a:p>
@@ -2192,7 +2194,7 @@
           <a:p>
             <a:fld id="{9403E73E-A2A3-4E22-8402-E10B9D12BA91}" type="datetimeFigureOut">
               <a:rPr lang="en-GB" smtClean="0"/>
-              <a:t>28/04/2022</a:t>
+              <a:t>29/04/2022</a:t>
             </a:fld>
             <a:endParaRPr lang="en-GB"/>
           </a:p>
@@ -2334,7 +2336,7 @@
           <a:p>
             <a:fld id="{9403E73E-A2A3-4E22-8402-E10B9D12BA91}" type="datetimeFigureOut">
               <a:rPr lang="en-GB" smtClean="0"/>
-              <a:t>28/04/2022</a:t>
+              <a:t>29/04/2022</a:t>
             </a:fld>
             <a:endParaRPr lang="en-GB"/>
           </a:p>
@@ -2447,7 +2449,7 @@
           <a:p>
             <a:fld id="{9403E73E-A2A3-4E22-8402-E10B9D12BA91}" type="datetimeFigureOut">
               <a:rPr lang="en-GB" smtClean="0"/>
-              <a:t>28/04/2022</a:t>
+              <a:t>29/04/2022</a:t>
             </a:fld>
             <a:endParaRPr lang="en-GB"/>
           </a:p>
@@ -2760,7 +2762,7 @@
           <a:p>
             <a:fld id="{9403E73E-A2A3-4E22-8402-E10B9D12BA91}" type="datetimeFigureOut">
               <a:rPr lang="en-GB" smtClean="0"/>
-              <a:t>28/04/2022</a:t>
+              <a:t>29/04/2022</a:t>
             </a:fld>
             <a:endParaRPr lang="en-GB"/>
           </a:p>
@@ -3049,7 +3051,7 @@
           <a:p>
             <a:fld id="{9403E73E-A2A3-4E22-8402-E10B9D12BA91}" type="datetimeFigureOut">
               <a:rPr lang="en-GB" smtClean="0"/>
-              <a:t>28/04/2022</a:t>
+              <a:t>29/04/2022</a:t>
             </a:fld>
             <a:endParaRPr lang="en-GB"/>
           </a:p>
@@ -3292,7 +3294,7 @@
           <a:p>
             <a:fld id="{9403E73E-A2A3-4E22-8402-E10B9D12BA91}" type="datetimeFigureOut">
               <a:rPr lang="en-GB" smtClean="0"/>
-              <a:t>28/04/2022</a:t>
+              <a:t>29/04/2022</a:t>
             </a:fld>
             <a:endParaRPr lang="en-GB"/>
           </a:p>
@@ -4957,6 +4959,1539 @@
           <p:cNvPr id="2" name="Cím 1">
             <a:extLst>
               <a:ext uri="{FF2B5EF4-FFF2-40B4-BE49-F238E27FC236}">
+                <a16:creationId xmlns:a16="http://schemas.microsoft.com/office/drawing/2014/main" id="{3753F180-C42C-4828-9A4A-8F0C6B71E3BC}"/>
+              </a:ext>
+            </a:extLst>
+          </p:cNvPr>
+          <p:cNvSpPr>
+            <a:spLocks noGrp="1"/>
+          </p:cNvSpPr>
+          <p:nvPr>
+            <p:ph type="title"/>
+          </p:nvPr>
+        </p:nvSpPr>
+        <p:spPr/>
+        <p:txBody>
+          <a:bodyPr/>
+          <a:lstStyle/>
+          <a:p>
+            <a:r>
+              <a:rPr lang="hu-HU" sz="4400" dirty="0"/>
+              <a:t>		</a:t>
+            </a:r>
+            <a:br>
+              <a:rPr lang="en-GB" sz="4400" dirty="0"/>
+            </a:br>
+            <a:endParaRPr lang="hu-HU" dirty="0"/>
+          </a:p>
+        </p:txBody>
+      </p:sp>
+      <p:sp>
+        <p:nvSpPr>
+          <p:cNvPr id="3" name="Tartalom helye 2">
+            <a:extLst>
+              <a:ext uri="{FF2B5EF4-FFF2-40B4-BE49-F238E27FC236}">
+                <a16:creationId xmlns:a16="http://schemas.microsoft.com/office/drawing/2014/main" id="{9F97BCEE-C013-4C4E-827A-E24A6C4BF1C2}"/>
+              </a:ext>
+            </a:extLst>
+          </p:cNvPr>
+          <p:cNvSpPr>
+            <a:spLocks noGrp="1"/>
+          </p:cNvSpPr>
+          <p:nvPr>
+            <p:ph idx="1"/>
+          </p:nvPr>
+        </p:nvSpPr>
+        <p:spPr>
+          <a:xfrm>
+            <a:off x="2295524" y="1813049"/>
+            <a:ext cx="7600951" cy="2101726"/>
+          </a:xfrm>
+        </p:spPr>
+        <p:txBody>
+          <a:bodyPr>
+            <a:normAutofit/>
+          </a:bodyPr>
+          <a:lstStyle/>
+          <a:p>
+            <a:r>
+              <a:rPr lang="hu-HU" sz="2000" dirty="0"/>
+              <a:t>Most online businesses </a:t>
+            </a:r>
+            <a:r>
+              <a:rPr lang="hu-HU" sz="2000" dirty="0" err="1"/>
+              <a:t>already</a:t>
+            </a:r>
+            <a:r>
+              <a:rPr lang="hu-HU" sz="2000" dirty="0"/>
+              <a:t> </a:t>
+            </a:r>
+            <a:r>
+              <a:rPr lang="hu-HU" sz="2000" dirty="0" err="1"/>
+              <a:t>have</a:t>
+            </a:r>
+            <a:r>
+              <a:rPr lang="hu-HU" sz="2000" dirty="0"/>
+              <a:t> </a:t>
+            </a:r>
+            <a:r>
+              <a:rPr lang="hu-HU" sz="2000" dirty="0" err="1"/>
+              <a:t>their</a:t>
+            </a:r>
+            <a:r>
+              <a:rPr lang="hu-HU" sz="2000" dirty="0"/>
+              <a:t> </a:t>
+            </a:r>
+            <a:r>
+              <a:rPr lang="hu-HU" sz="2000" dirty="0" err="1"/>
+              <a:t>own</a:t>
+            </a:r>
+            <a:r>
+              <a:rPr lang="hu-HU" sz="2000" dirty="0"/>
+              <a:t> website.</a:t>
+            </a:r>
+          </a:p>
+          <a:p>
+            <a:r>
+              <a:rPr lang="hu-HU" sz="2000" dirty="0"/>
+              <a:t>A webshop </a:t>
+            </a:r>
+            <a:r>
+              <a:rPr lang="hu-HU" sz="2000" dirty="0" err="1"/>
+              <a:t>requires</a:t>
+            </a:r>
+            <a:r>
+              <a:rPr lang="hu-HU" sz="2000" dirty="0"/>
+              <a:t> </a:t>
+            </a:r>
+            <a:r>
+              <a:rPr lang="hu-HU" sz="2000" dirty="0" err="1"/>
+              <a:t>much</a:t>
+            </a:r>
+            <a:r>
+              <a:rPr lang="hu-HU" sz="2000" dirty="0"/>
+              <a:t> less </a:t>
+            </a:r>
+            <a:r>
+              <a:rPr lang="hu-HU" sz="2000" dirty="0" err="1"/>
+              <a:t>maintenance</a:t>
+            </a:r>
+            <a:r>
+              <a:rPr lang="hu-HU" sz="2000" dirty="0"/>
+              <a:t> cost</a:t>
+            </a:r>
+          </a:p>
+          <a:p>
+            <a:r>
+              <a:rPr lang="hu-HU" sz="2000" dirty="0" err="1"/>
+              <a:t>With</a:t>
+            </a:r>
+            <a:r>
+              <a:rPr lang="hu-HU" sz="2000" dirty="0"/>
+              <a:t> a webshop a business </a:t>
+            </a:r>
+            <a:r>
+              <a:rPr lang="hu-HU" sz="2000" dirty="0" err="1"/>
+              <a:t>can</a:t>
+            </a:r>
+            <a:r>
+              <a:rPr lang="hu-HU" sz="2000" dirty="0"/>
+              <a:t> </a:t>
+            </a:r>
+            <a:r>
+              <a:rPr lang="hu-HU" sz="2000" dirty="0" err="1"/>
+              <a:t>reach</a:t>
+            </a:r>
+            <a:r>
+              <a:rPr lang="hu-HU" sz="2000" dirty="0"/>
+              <a:t> a </a:t>
+            </a:r>
+            <a:r>
+              <a:rPr lang="hu-HU" sz="2000" dirty="0" err="1"/>
+              <a:t>much</a:t>
+            </a:r>
+            <a:r>
+              <a:rPr lang="hu-HU" sz="2000" dirty="0"/>
+              <a:t> </a:t>
+            </a:r>
+            <a:r>
+              <a:rPr lang="hu-HU" sz="2000" dirty="0" err="1"/>
+              <a:t>higher</a:t>
+            </a:r>
+            <a:r>
+              <a:rPr lang="hu-HU" sz="2000" dirty="0"/>
+              <a:t> </a:t>
+            </a:r>
+            <a:r>
+              <a:rPr lang="hu-HU" sz="2000" dirty="0" err="1"/>
+              <a:t>audience</a:t>
+            </a:r>
+            <a:endParaRPr lang="hu-HU" sz="2000" dirty="0"/>
+          </a:p>
+          <a:p>
+            <a:r>
+              <a:rPr lang="hu-HU" sz="2000" dirty="0" err="1"/>
+              <a:t>Making</a:t>
+            </a:r>
+            <a:r>
+              <a:rPr lang="hu-HU" sz="2000" dirty="0"/>
+              <a:t> a website </a:t>
+            </a:r>
+            <a:r>
+              <a:rPr lang="hu-HU" sz="2000" dirty="0" err="1"/>
+              <a:t>for</a:t>
+            </a:r>
+            <a:r>
+              <a:rPr lang="hu-HU" sz="2000" dirty="0"/>
+              <a:t> a business </a:t>
+            </a:r>
+            <a:r>
+              <a:rPr lang="hu-HU" sz="2000" dirty="0" err="1"/>
+              <a:t>can</a:t>
+            </a:r>
+            <a:r>
+              <a:rPr lang="hu-HU" sz="2000" dirty="0"/>
+              <a:t> be </a:t>
+            </a:r>
+            <a:r>
+              <a:rPr lang="hu-HU" sz="2000" dirty="0" err="1"/>
+              <a:t>considered</a:t>
+            </a:r>
+            <a:r>
+              <a:rPr lang="hu-HU" sz="2000" dirty="0"/>
+              <a:t> a </a:t>
+            </a:r>
+            <a:r>
+              <a:rPr lang="hu-HU" sz="2000" dirty="0" err="1"/>
+              <a:t>standerd</a:t>
+            </a:r>
+            <a:r>
+              <a:rPr lang="hu-HU" sz="2000" dirty="0"/>
+              <a:t> </a:t>
+            </a:r>
+            <a:r>
+              <a:rPr lang="hu-HU" sz="2000" dirty="0" err="1"/>
+              <a:t>requirement</a:t>
+            </a:r>
+            <a:endParaRPr lang="hu-HU" sz="2000" dirty="0"/>
+          </a:p>
+          <a:p>
+            <a:endParaRPr lang="hu-HU" sz="2000" dirty="0"/>
+          </a:p>
+          <a:p>
+            <a:endParaRPr lang="hu-HU" sz="2000" dirty="0"/>
+          </a:p>
+        </p:txBody>
+      </p:sp>
+      <p:sp>
+        <p:nvSpPr>
+          <p:cNvPr id="4" name="Cím 1">
+            <a:extLst>
+              <a:ext uri="{FF2B5EF4-FFF2-40B4-BE49-F238E27FC236}">
+                <a16:creationId xmlns:a16="http://schemas.microsoft.com/office/drawing/2014/main" id="{BB6A1BE4-74F4-4139-946B-D5B786B12430}"/>
+              </a:ext>
+            </a:extLst>
+          </p:cNvPr>
+          <p:cNvSpPr txBox="1">
+            <a:spLocks/>
+          </p:cNvSpPr>
+          <p:nvPr/>
+        </p:nvSpPr>
+        <p:spPr>
+          <a:xfrm>
+            <a:off x="1524000" y="487486"/>
+            <a:ext cx="9144000" cy="847114"/>
+          </a:xfrm>
+          <a:prstGeom prst="rect">
+            <a:avLst/>
+          </a:prstGeom>
+          <a:ln>
+            <a:noFill/>
+          </a:ln>
+        </p:spPr>
+        <p:txBody>
+          <a:bodyPr vert="horz" lIns="91440" tIns="45720" rIns="91440" bIns="45720" rtlCol="0" anchor="ctr">
+            <a:normAutofit fontScale="67500" lnSpcReduction="20000"/>
+          </a:bodyPr>
+          <a:lstStyle>
+            <a:lvl1pPr algn="l" defTabSz="914400" rtl="0" eaLnBrk="1" latinLnBrk="0" hangingPunct="1">
+              <a:lnSpc>
+                <a:spcPct val="90000"/>
+              </a:lnSpc>
+              <a:spcBef>
+                <a:spcPct val="0"/>
+              </a:spcBef>
+              <a:buNone/>
+              <a:defRPr sz="4400" kern="1200">
+                <a:solidFill>
+                  <a:schemeClr val="tx1"/>
+                </a:solidFill>
+                <a:latin typeface="+mj-lt"/>
+                <a:ea typeface="+mj-ea"/>
+                <a:cs typeface="+mj-cs"/>
+              </a:defRPr>
+            </a:lvl1pPr>
+          </a:lstStyle>
+          <a:p>
+            <a:pPr marL="0" lvl="1">
+              <a:defRPr/>
+            </a:pPr>
+            <a:r>
+              <a:rPr lang="hu-HU" sz="6000" kern="0" dirty="0">
+                <a:solidFill>
+                  <a:schemeClr val="tx1">
+                    <a:lumMod val="75000"/>
+                    <a:lumOff val="25000"/>
+                  </a:schemeClr>
+                </a:solidFill>
+                <a:latin typeface="Arial" panose="020B0604020202020204" pitchFamily="34" charset="0"/>
+                <a:cs typeface="Arial" panose="020B0604020202020204" pitchFamily="34" charset="0"/>
+              </a:rPr>
+              <a:t>	        </a:t>
+            </a:r>
+            <a:r>
+              <a:rPr lang="hu-HU" sz="5400" dirty="0" err="1"/>
+              <a:t>Why</a:t>
+            </a:r>
+            <a:r>
+              <a:rPr lang="hu-HU" sz="5400" dirty="0"/>
+              <a:t> </a:t>
+            </a:r>
+            <a:r>
+              <a:rPr lang="hu-HU" sz="5400" dirty="0" err="1"/>
+              <a:t>are</a:t>
+            </a:r>
+            <a:r>
+              <a:rPr lang="hu-HU" sz="5400" dirty="0"/>
+              <a:t> </a:t>
+            </a:r>
+            <a:r>
+              <a:rPr lang="hu-HU" sz="5400" dirty="0" err="1"/>
+              <a:t>we</a:t>
+            </a:r>
+            <a:r>
+              <a:rPr lang="hu-HU" sz="5400" dirty="0"/>
+              <a:t> </a:t>
+            </a:r>
+            <a:r>
+              <a:rPr lang="hu-HU" sz="5400" dirty="0" err="1"/>
+              <a:t>making</a:t>
+            </a:r>
+            <a:r>
+              <a:rPr lang="hu-HU" sz="5400" dirty="0"/>
+              <a:t> a webshop?</a:t>
+            </a:r>
+            <a:endParaRPr lang="en-GB" sz="5400" dirty="0"/>
+          </a:p>
+        </p:txBody>
+      </p:sp>
+      <p:cxnSp>
+        <p:nvCxnSpPr>
+          <p:cNvPr id="5" name="Egyenes összekötő 4">
+            <a:extLst>
+              <a:ext uri="{FF2B5EF4-FFF2-40B4-BE49-F238E27FC236}">
+                <a16:creationId xmlns:a16="http://schemas.microsoft.com/office/drawing/2014/main" id="{F56988C3-69C4-4421-9F78-FC61B75C905C}"/>
+              </a:ext>
+            </a:extLst>
+          </p:cNvPr>
+          <p:cNvCxnSpPr>
+            <a:cxnSpLocks/>
+          </p:cNvCxnSpPr>
+          <p:nvPr/>
+        </p:nvCxnSpPr>
+        <p:spPr>
+          <a:xfrm>
+            <a:off x="3681756" y="1238247"/>
+            <a:ext cx="5863472" cy="0"/>
+          </a:xfrm>
+          <a:prstGeom prst="line">
+            <a:avLst/>
+          </a:prstGeom>
+          <a:ln w="25400">
+            <a:solidFill>
+              <a:schemeClr val="tx1">
+                <a:lumMod val="50000"/>
+                <a:lumOff val="50000"/>
+              </a:schemeClr>
+            </a:solidFill>
+          </a:ln>
+        </p:spPr>
+        <p:style>
+          <a:lnRef idx="1">
+            <a:schemeClr val="accent1"/>
+          </a:lnRef>
+          <a:fillRef idx="0">
+            <a:schemeClr val="accent1"/>
+          </a:fillRef>
+          <a:effectRef idx="0">
+            <a:schemeClr val="accent1"/>
+          </a:effectRef>
+          <a:fontRef idx="minor">
+            <a:schemeClr val="tx1"/>
+          </a:fontRef>
+        </p:style>
+      </p:cxnSp>
+      <p:sp>
+        <p:nvSpPr>
+          <p:cNvPr id="6" name="Tartalom helye 2">
+            <a:extLst>
+              <a:ext uri="{FF2B5EF4-FFF2-40B4-BE49-F238E27FC236}">
+                <a16:creationId xmlns:a16="http://schemas.microsoft.com/office/drawing/2014/main" id="{0A7BCA7C-42FB-4240-A145-2F6FFCBA8E1A}"/>
+              </a:ext>
+            </a:extLst>
+          </p:cNvPr>
+          <p:cNvSpPr txBox="1">
+            <a:spLocks/>
+          </p:cNvSpPr>
+          <p:nvPr/>
+        </p:nvSpPr>
+        <p:spPr>
+          <a:xfrm>
+            <a:off x="2295523" y="4272087"/>
+            <a:ext cx="7600951" cy="2101726"/>
+          </a:xfrm>
+          <a:prstGeom prst="rect">
+            <a:avLst/>
+          </a:prstGeom>
+        </p:spPr>
+        <p:txBody>
+          <a:bodyPr vert="horz" lIns="91440" tIns="45720" rIns="91440" bIns="45720" rtlCol="0">
+            <a:normAutofit/>
+          </a:bodyPr>
+          <a:lstStyle>
+            <a:lvl1pPr marL="228600" indent="-228600" algn="l" defTabSz="914400" rtl="0" eaLnBrk="1" latinLnBrk="0" hangingPunct="1">
+              <a:lnSpc>
+                <a:spcPct val="90000"/>
+              </a:lnSpc>
+              <a:spcBef>
+                <a:spcPts val="1000"/>
+              </a:spcBef>
+              <a:buFont typeface="Arial" panose="020B0604020202020204" pitchFamily="34" charset="0"/>
+              <a:buChar char="•"/>
+              <a:defRPr sz="2800" kern="1200">
+                <a:solidFill>
+                  <a:schemeClr val="tx1"/>
+                </a:solidFill>
+                <a:latin typeface="+mn-lt"/>
+                <a:ea typeface="+mn-ea"/>
+                <a:cs typeface="+mn-cs"/>
+              </a:defRPr>
+            </a:lvl1pPr>
+            <a:lvl2pPr marL="685800" indent="-228600" algn="l" defTabSz="914400" rtl="0" eaLnBrk="1" latinLnBrk="0" hangingPunct="1">
+              <a:lnSpc>
+                <a:spcPct val="90000"/>
+              </a:lnSpc>
+              <a:spcBef>
+                <a:spcPts val="500"/>
+              </a:spcBef>
+              <a:buFont typeface="Arial" panose="020B0604020202020204" pitchFamily="34" charset="0"/>
+              <a:buChar char="•"/>
+              <a:defRPr sz="2400" kern="1200">
+                <a:solidFill>
+                  <a:schemeClr val="tx1"/>
+                </a:solidFill>
+                <a:latin typeface="+mn-lt"/>
+                <a:ea typeface="+mn-ea"/>
+                <a:cs typeface="+mn-cs"/>
+              </a:defRPr>
+            </a:lvl2pPr>
+            <a:lvl3pPr marL="1143000" indent="-228600" algn="l" defTabSz="914400" rtl="0" eaLnBrk="1" latinLnBrk="0" hangingPunct="1">
+              <a:lnSpc>
+                <a:spcPct val="90000"/>
+              </a:lnSpc>
+              <a:spcBef>
+                <a:spcPts val="500"/>
+              </a:spcBef>
+              <a:buFont typeface="Arial" panose="020B0604020202020204" pitchFamily="34" charset="0"/>
+              <a:buChar char="•"/>
+              <a:defRPr sz="2000" kern="1200">
+                <a:solidFill>
+                  <a:schemeClr val="tx1"/>
+                </a:solidFill>
+                <a:latin typeface="+mn-lt"/>
+                <a:ea typeface="+mn-ea"/>
+                <a:cs typeface="+mn-cs"/>
+              </a:defRPr>
+            </a:lvl3pPr>
+            <a:lvl4pPr marL="1600200" indent="-228600" algn="l" defTabSz="914400" rtl="0" eaLnBrk="1" latinLnBrk="0" hangingPunct="1">
+              <a:lnSpc>
+                <a:spcPct val="90000"/>
+              </a:lnSpc>
+              <a:spcBef>
+                <a:spcPts val="500"/>
+              </a:spcBef>
+              <a:buFont typeface="Arial" panose="020B0604020202020204" pitchFamily="34" charset="0"/>
+              <a:buChar char="•"/>
+              <a:defRPr sz="1800" kern="1200">
+                <a:solidFill>
+                  <a:schemeClr val="tx1"/>
+                </a:solidFill>
+                <a:latin typeface="+mn-lt"/>
+                <a:ea typeface="+mn-ea"/>
+                <a:cs typeface="+mn-cs"/>
+              </a:defRPr>
+            </a:lvl4pPr>
+            <a:lvl5pPr marL="2057400" indent="-228600" algn="l" defTabSz="914400" rtl="0" eaLnBrk="1" latinLnBrk="0" hangingPunct="1">
+              <a:lnSpc>
+                <a:spcPct val="90000"/>
+              </a:lnSpc>
+              <a:spcBef>
+                <a:spcPts val="500"/>
+              </a:spcBef>
+              <a:buFont typeface="Arial" panose="020B0604020202020204" pitchFamily="34" charset="0"/>
+              <a:buChar char="•"/>
+              <a:defRPr sz="1800" kern="1200">
+                <a:solidFill>
+                  <a:schemeClr val="tx1"/>
+                </a:solidFill>
+                <a:latin typeface="+mn-lt"/>
+                <a:ea typeface="+mn-ea"/>
+                <a:cs typeface="+mn-cs"/>
+              </a:defRPr>
+            </a:lvl5pPr>
+            <a:lvl6pPr marL="2514600" indent="-228600" algn="l" defTabSz="914400" rtl="0" eaLnBrk="1" latinLnBrk="0" hangingPunct="1">
+              <a:lnSpc>
+                <a:spcPct val="90000"/>
+              </a:lnSpc>
+              <a:spcBef>
+                <a:spcPts val="500"/>
+              </a:spcBef>
+              <a:buFont typeface="Arial" panose="020B0604020202020204" pitchFamily="34" charset="0"/>
+              <a:buChar char="•"/>
+              <a:defRPr sz="1800" kern="1200">
+                <a:solidFill>
+                  <a:schemeClr val="tx1"/>
+                </a:solidFill>
+                <a:latin typeface="+mn-lt"/>
+                <a:ea typeface="+mn-ea"/>
+                <a:cs typeface="+mn-cs"/>
+              </a:defRPr>
+            </a:lvl6pPr>
+            <a:lvl7pPr marL="2971800" indent="-228600" algn="l" defTabSz="914400" rtl="0" eaLnBrk="1" latinLnBrk="0" hangingPunct="1">
+              <a:lnSpc>
+                <a:spcPct val="90000"/>
+              </a:lnSpc>
+              <a:spcBef>
+                <a:spcPts val="500"/>
+              </a:spcBef>
+              <a:buFont typeface="Arial" panose="020B0604020202020204" pitchFamily="34" charset="0"/>
+              <a:buChar char="•"/>
+              <a:defRPr sz="1800" kern="1200">
+                <a:solidFill>
+                  <a:schemeClr val="tx1"/>
+                </a:solidFill>
+                <a:latin typeface="+mn-lt"/>
+                <a:ea typeface="+mn-ea"/>
+                <a:cs typeface="+mn-cs"/>
+              </a:defRPr>
+            </a:lvl7pPr>
+            <a:lvl8pPr marL="3429000" indent="-228600" algn="l" defTabSz="914400" rtl="0" eaLnBrk="1" latinLnBrk="0" hangingPunct="1">
+              <a:lnSpc>
+                <a:spcPct val="90000"/>
+              </a:lnSpc>
+              <a:spcBef>
+                <a:spcPts val="500"/>
+              </a:spcBef>
+              <a:buFont typeface="Arial" panose="020B0604020202020204" pitchFamily="34" charset="0"/>
+              <a:buChar char="•"/>
+              <a:defRPr sz="1800" kern="1200">
+                <a:solidFill>
+                  <a:schemeClr val="tx1"/>
+                </a:solidFill>
+                <a:latin typeface="+mn-lt"/>
+                <a:ea typeface="+mn-ea"/>
+                <a:cs typeface="+mn-cs"/>
+              </a:defRPr>
+            </a:lvl8pPr>
+            <a:lvl9pPr marL="3886200" indent="-228600" algn="l" defTabSz="914400" rtl="0" eaLnBrk="1" latinLnBrk="0" hangingPunct="1">
+              <a:lnSpc>
+                <a:spcPct val="90000"/>
+              </a:lnSpc>
+              <a:spcBef>
+                <a:spcPts val="500"/>
+              </a:spcBef>
+              <a:buFont typeface="Arial" panose="020B0604020202020204" pitchFamily="34" charset="0"/>
+              <a:buChar char="•"/>
+              <a:defRPr sz="1800" kern="1200">
+                <a:solidFill>
+                  <a:schemeClr val="tx1"/>
+                </a:solidFill>
+                <a:latin typeface="+mn-lt"/>
+                <a:ea typeface="+mn-ea"/>
+                <a:cs typeface="+mn-cs"/>
+              </a:defRPr>
+            </a:lvl9pPr>
+          </a:lstStyle>
+          <a:p>
+            <a:pPr marL="0" indent="0" algn="ctr">
+              <a:buNone/>
+            </a:pPr>
+            <a:r>
+              <a:rPr lang="hu-HU" dirty="0" err="1"/>
+              <a:t>Conclusion</a:t>
+            </a:r>
+            <a:r>
+              <a:rPr lang="hu-HU" dirty="0"/>
+              <a:t>:</a:t>
+            </a:r>
+          </a:p>
+          <a:p>
+            <a:pPr marL="0" indent="0" algn="ctr">
+              <a:buNone/>
+            </a:pPr>
+            <a:r>
+              <a:rPr lang="hu-HU" sz="2000" dirty="0" err="1"/>
+              <a:t>Today</a:t>
+            </a:r>
+            <a:r>
+              <a:rPr lang="hu-HU" sz="2000" dirty="0"/>
+              <a:t> </a:t>
+            </a:r>
+            <a:r>
+              <a:rPr lang="hu-HU" sz="2000" dirty="0" err="1"/>
+              <a:t>every</a:t>
+            </a:r>
+            <a:r>
+              <a:rPr lang="hu-HU" sz="2000" dirty="0"/>
+              <a:t> business </a:t>
+            </a:r>
+            <a:r>
+              <a:rPr lang="hu-HU" sz="2000" dirty="0" err="1"/>
+              <a:t>should</a:t>
+            </a:r>
+            <a:r>
+              <a:rPr lang="hu-HU" sz="2000" dirty="0"/>
+              <a:t> </a:t>
+            </a:r>
+            <a:r>
+              <a:rPr lang="hu-HU" sz="2000" dirty="0" err="1"/>
+              <a:t>consider</a:t>
+            </a:r>
+            <a:r>
+              <a:rPr lang="hu-HU" sz="2000" dirty="0"/>
+              <a:t> </a:t>
+            </a:r>
+            <a:r>
+              <a:rPr lang="hu-HU" sz="2000" dirty="0" err="1"/>
+              <a:t>having</a:t>
+            </a:r>
+            <a:r>
+              <a:rPr lang="hu-HU" sz="2000" dirty="0"/>
+              <a:t> an online platform,</a:t>
+            </a:r>
+          </a:p>
+          <a:p>
+            <a:pPr marL="0" indent="0" algn="ctr">
+              <a:buNone/>
+            </a:pPr>
+            <a:r>
+              <a:rPr lang="hu-HU" sz="2000" dirty="0" err="1"/>
+              <a:t>because</a:t>
+            </a:r>
+            <a:r>
+              <a:rPr lang="hu-HU" sz="2000" dirty="0"/>
+              <a:t> </a:t>
+            </a:r>
+            <a:r>
+              <a:rPr lang="hu-HU" sz="2000" dirty="0" err="1"/>
+              <a:t>it</a:t>
+            </a:r>
+            <a:r>
+              <a:rPr lang="hu-HU" sz="2000" dirty="0"/>
+              <a:t> </a:t>
+            </a:r>
+            <a:r>
+              <a:rPr lang="hu-HU" sz="2000" dirty="0" err="1"/>
+              <a:t>make</a:t>
+            </a:r>
+            <a:r>
+              <a:rPr lang="hu-HU" sz="2000" dirty="0"/>
+              <a:t> </a:t>
+            </a:r>
+            <a:r>
+              <a:rPr lang="hu-HU" sz="2000" dirty="0" err="1"/>
+              <a:t>the</a:t>
+            </a:r>
+            <a:r>
+              <a:rPr lang="hu-HU" sz="2000" dirty="0"/>
+              <a:t> </a:t>
+            </a:r>
+            <a:r>
+              <a:rPr lang="hu-HU" sz="2000" dirty="0" err="1"/>
+              <a:t>difference</a:t>
+            </a:r>
+            <a:r>
+              <a:rPr lang="hu-HU" sz="2000" dirty="0"/>
+              <a:t>,</a:t>
+            </a:r>
+          </a:p>
+          <a:p>
+            <a:pPr marL="0" indent="0" algn="ctr">
+              <a:buNone/>
+            </a:pPr>
+            <a:r>
+              <a:rPr lang="hu-HU" sz="2000" dirty="0" err="1"/>
+              <a:t>nowdays</a:t>
+            </a:r>
+            <a:r>
+              <a:rPr lang="hu-HU" sz="2000" dirty="0"/>
+              <a:t> </a:t>
+            </a:r>
+            <a:r>
+              <a:rPr lang="hu-HU" sz="2000" dirty="0" err="1"/>
+              <a:t>this</a:t>
+            </a:r>
+            <a:r>
+              <a:rPr lang="hu-HU" sz="2000" dirty="0"/>
+              <a:t> </a:t>
+            </a:r>
+            <a:r>
+              <a:rPr lang="hu-HU" sz="2000" dirty="0" err="1"/>
+              <a:t>fack</a:t>
+            </a:r>
+            <a:r>
+              <a:rPr lang="hu-HU" sz="2000" dirty="0"/>
+              <a:t> is </a:t>
+            </a:r>
+            <a:r>
+              <a:rPr lang="hu-HU" sz="2000" dirty="0" err="1"/>
+              <a:t>widely</a:t>
+            </a:r>
+            <a:r>
+              <a:rPr lang="hu-HU" sz="2000" dirty="0"/>
+              <a:t> </a:t>
+            </a:r>
+            <a:r>
+              <a:rPr lang="hu-HU" sz="2000" dirty="0" err="1"/>
+              <a:t>recognised</a:t>
+            </a:r>
+            <a:r>
+              <a:rPr lang="hu-HU" sz="2000" dirty="0"/>
+              <a:t> and more and more</a:t>
+            </a:r>
+          </a:p>
+          <a:p>
+            <a:pPr marL="0" indent="0" algn="ctr">
+              <a:buNone/>
+            </a:pPr>
+            <a:r>
+              <a:rPr lang="hu-HU" sz="2000" dirty="0" err="1"/>
+              <a:t>sites</a:t>
+            </a:r>
+            <a:r>
+              <a:rPr lang="hu-HU" sz="2000" dirty="0"/>
+              <a:t> </a:t>
+            </a:r>
+            <a:r>
+              <a:rPr lang="hu-HU" sz="2000" dirty="0" err="1"/>
+              <a:t>are</a:t>
+            </a:r>
+            <a:r>
+              <a:rPr lang="hu-HU" sz="2000" dirty="0"/>
+              <a:t> </a:t>
+            </a:r>
+            <a:r>
+              <a:rPr lang="hu-HU" sz="2000" dirty="0" err="1"/>
+              <a:t>being</a:t>
+            </a:r>
+            <a:r>
+              <a:rPr lang="hu-HU" sz="2000" dirty="0"/>
+              <a:t> </a:t>
+            </a:r>
+            <a:r>
+              <a:rPr lang="hu-HU" sz="2000" dirty="0" err="1"/>
+              <a:t>created</a:t>
+            </a:r>
+            <a:r>
+              <a:rPr lang="hu-HU" sz="2000" dirty="0"/>
+              <a:t> </a:t>
+            </a:r>
+            <a:r>
+              <a:rPr lang="hu-HU" sz="2000" dirty="0" err="1"/>
+              <a:t>to</a:t>
+            </a:r>
+            <a:r>
+              <a:rPr lang="hu-HU" sz="2000" dirty="0"/>
+              <a:t> </a:t>
+            </a:r>
+            <a:r>
+              <a:rPr lang="hu-HU" sz="2000" dirty="0" err="1"/>
+              <a:t>offer</a:t>
+            </a:r>
+            <a:r>
+              <a:rPr lang="hu-HU" sz="2000" dirty="0"/>
+              <a:t> a </a:t>
+            </a:r>
+            <a:r>
+              <a:rPr lang="hu-HU" sz="2000" dirty="0" err="1"/>
+              <a:t>place</a:t>
+            </a:r>
+            <a:r>
+              <a:rPr lang="hu-HU" sz="2000" dirty="0"/>
+              <a:t> </a:t>
+            </a:r>
+            <a:r>
+              <a:rPr lang="hu-HU" sz="2000" dirty="0" err="1"/>
+              <a:t>for</a:t>
+            </a:r>
+            <a:r>
+              <a:rPr lang="hu-HU" sz="2000" dirty="0"/>
+              <a:t> online </a:t>
+            </a:r>
+            <a:r>
+              <a:rPr lang="hu-HU" sz="2000" dirty="0" err="1"/>
+              <a:t>transactions</a:t>
+            </a:r>
+            <a:r>
+              <a:rPr lang="hu-HU" sz="2000" dirty="0"/>
+              <a:t>.</a:t>
+            </a:r>
+          </a:p>
+          <a:p>
+            <a:endParaRPr lang="hu-HU" sz="2000" dirty="0"/>
+          </a:p>
+        </p:txBody>
+      </p:sp>
+    </p:spTree>
+    <p:extLst>
+      <p:ext uri="{BB962C8B-B14F-4D97-AF65-F5344CB8AC3E}">
+        <p14:creationId xmlns:p14="http://schemas.microsoft.com/office/powerpoint/2010/main" val="256944397"/>
+      </p:ext>
+    </p:extLst>
+  </p:cSld>
+  <p:clrMapOvr>
+    <a:masterClrMapping/>
+  </p:clrMapOvr>
+</p:sld>
+</file>
+
+<file path=ppt/slides/slide3.xml><?xml version="1.0" encoding="utf-8"?>
+<p:sld xmlns:a="http://schemas.openxmlformats.org/drawingml/2006/main" xmlns:r="http://schemas.openxmlformats.org/officeDocument/2006/relationships" xmlns:p="http://schemas.openxmlformats.org/presentationml/2006/main">
+  <p:cSld>
+    <p:spTree>
+      <p:nvGrpSpPr>
+        <p:cNvPr id="1" name=""/>
+        <p:cNvGrpSpPr/>
+        <p:nvPr/>
+      </p:nvGrpSpPr>
+      <p:grpSpPr>
+        <a:xfrm>
+          <a:off x="0" y="0"/>
+          <a:ext cx="0" cy="0"/>
+          <a:chOff x="0" y="0"/>
+          <a:chExt cx="0" cy="0"/>
+        </a:xfrm>
+      </p:grpSpPr>
+      <p:sp>
+        <p:nvSpPr>
+          <p:cNvPr id="2" name="Cím 1">
+            <a:extLst>
+              <a:ext uri="{FF2B5EF4-FFF2-40B4-BE49-F238E27FC236}">
+                <a16:creationId xmlns:a16="http://schemas.microsoft.com/office/drawing/2014/main" id="{3753F180-C42C-4828-9A4A-8F0C6B71E3BC}"/>
+              </a:ext>
+            </a:extLst>
+          </p:cNvPr>
+          <p:cNvSpPr>
+            <a:spLocks noGrp="1"/>
+          </p:cNvSpPr>
+          <p:nvPr>
+            <p:ph type="title"/>
+          </p:nvPr>
+        </p:nvSpPr>
+        <p:spPr/>
+        <p:txBody>
+          <a:bodyPr/>
+          <a:lstStyle/>
+          <a:p>
+            <a:r>
+              <a:rPr lang="hu-HU" sz="4400" dirty="0"/>
+              <a:t>		</a:t>
+            </a:r>
+            <a:br>
+              <a:rPr lang="en-GB" sz="4400" dirty="0"/>
+            </a:br>
+            <a:endParaRPr lang="hu-HU" dirty="0"/>
+          </a:p>
+        </p:txBody>
+      </p:sp>
+      <p:sp>
+        <p:nvSpPr>
+          <p:cNvPr id="3" name="Tartalom helye 2">
+            <a:extLst>
+              <a:ext uri="{FF2B5EF4-FFF2-40B4-BE49-F238E27FC236}">
+                <a16:creationId xmlns:a16="http://schemas.microsoft.com/office/drawing/2014/main" id="{9F97BCEE-C013-4C4E-827A-E24A6C4BF1C2}"/>
+              </a:ext>
+            </a:extLst>
+          </p:cNvPr>
+          <p:cNvSpPr>
+            <a:spLocks noGrp="1"/>
+          </p:cNvSpPr>
+          <p:nvPr>
+            <p:ph idx="1"/>
+          </p:nvPr>
+        </p:nvSpPr>
+        <p:spPr>
+          <a:xfrm>
+            <a:off x="2489164" y="4245340"/>
+            <a:ext cx="7600951" cy="2101726"/>
+          </a:xfrm>
+        </p:spPr>
+        <p:txBody>
+          <a:bodyPr>
+            <a:normAutofit/>
+          </a:bodyPr>
+          <a:lstStyle/>
+          <a:p>
+            <a:r>
+              <a:rPr lang="hu-HU" sz="2000" dirty="0" err="1"/>
+              <a:t>We</a:t>
+            </a:r>
+            <a:r>
+              <a:rPr lang="hu-HU" sz="2000" dirty="0"/>
+              <a:t> </a:t>
+            </a:r>
+            <a:r>
+              <a:rPr lang="hu-HU" sz="2000" dirty="0" err="1"/>
+              <a:t>provide</a:t>
+            </a:r>
+            <a:r>
+              <a:rPr lang="hu-HU" sz="2000" dirty="0"/>
+              <a:t> a </a:t>
+            </a:r>
+            <a:r>
+              <a:rPr lang="hu-HU" sz="2000" dirty="0" err="1"/>
+              <a:t>stabile</a:t>
+            </a:r>
+            <a:r>
+              <a:rPr lang="hu-HU" sz="2000" dirty="0"/>
+              <a:t> and </a:t>
+            </a:r>
+            <a:r>
+              <a:rPr lang="hu-HU" sz="2000" dirty="0" err="1"/>
+              <a:t>fast</a:t>
+            </a:r>
+            <a:r>
+              <a:rPr lang="hu-HU" sz="2000" dirty="0"/>
+              <a:t> </a:t>
+            </a:r>
+            <a:r>
+              <a:rPr lang="hu-HU" sz="2000" dirty="0" err="1"/>
+              <a:t>background</a:t>
+            </a:r>
+            <a:r>
+              <a:rPr lang="hu-HU" sz="2000" dirty="0"/>
+              <a:t> </a:t>
+            </a:r>
+            <a:r>
+              <a:rPr lang="hu-HU" sz="2000" dirty="0" err="1"/>
+              <a:t>for</a:t>
+            </a:r>
+            <a:r>
+              <a:rPr lang="hu-HU" sz="2000" dirty="0"/>
+              <a:t> </a:t>
+            </a:r>
+            <a:r>
+              <a:rPr lang="hu-HU" sz="2000" dirty="0" err="1"/>
+              <a:t>our</a:t>
+            </a:r>
+            <a:r>
+              <a:rPr lang="hu-HU" sz="2000" dirty="0"/>
+              <a:t> shop</a:t>
+            </a:r>
+          </a:p>
+          <a:p>
+            <a:r>
+              <a:rPr lang="hu-HU" sz="2000" dirty="0"/>
+              <a:t>Website is </a:t>
+            </a:r>
+            <a:r>
+              <a:rPr lang="hu-HU" sz="2000" dirty="0" err="1"/>
+              <a:t>visually</a:t>
+            </a:r>
+            <a:r>
+              <a:rPr lang="hu-HU" sz="2000" dirty="0"/>
+              <a:t> </a:t>
+            </a:r>
+            <a:r>
+              <a:rPr lang="hu-HU" sz="2000" dirty="0" err="1"/>
+              <a:t>appealing</a:t>
+            </a:r>
+            <a:endParaRPr lang="hu-HU" sz="2000" dirty="0"/>
+          </a:p>
+          <a:p>
+            <a:r>
+              <a:rPr lang="hu-HU" sz="2000" dirty="0" err="1"/>
+              <a:t>With</a:t>
+            </a:r>
+            <a:r>
+              <a:rPr lang="hu-HU" sz="2000" dirty="0"/>
+              <a:t> a </a:t>
+            </a:r>
+            <a:r>
+              <a:rPr lang="hu-HU" sz="2000" dirty="0" err="1"/>
+              <a:t>dedictaded</a:t>
+            </a:r>
+            <a:r>
+              <a:rPr lang="hu-HU" sz="2000" dirty="0"/>
+              <a:t> mobile </a:t>
+            </a:r>
+            <a:r>
+              <a:rPr lang="hu-HU" sz="2000" dirty="0" err="1"/>
+              <a:t>application</a:t>
+            </a:r>
+            <a:r>
+              <a:rPr lang="hu-HU" sz="2000" dirty="0"/>
+              <a:t> shopping </a:t>
+            </a:r>
+            <a:r>
+              <a:rPr lang="hu-HU" sz="2000" dirty="0" err="1"/>
+              <a:t>never</a:t>
+            </a:r>
+            <a:r>
+              <a:rPr lang="hu-HU" sz="2000" dirty="0"/>
+              <a:t> </a:t>
+            </a:r>
+            <a:r>
+              <a:rPr lang="hu-HU" sz="2000" dirty="0" err="1"/>
+              <a:t>were</a:t>
+            </a:r>
+            <a:r>
+              <a:rPr lang="hu-HU" sz="2000" dirty="0"/>
+              <a:t> </a:t>
+            </a:r>
+            <a:r>
+              <a:rPr lang="hu-HU" sz="2000" dirty="0" err="1"/>
+              <a:t>easier</a:t>
+            </a:r>
+            <a:endParaRPr lang="hu-HU" sz="2000" dirty="0"/>
+          </a:p>
+          <a:p>
+            <a:endParaRPr lang="hu-HU" sz="2000" dirty="0"/>
+          </a:p>
+          <a:p>
+            <a:endParaRPr lang="hu-HU" sz="2000" dirty="0"/>
+          </a:p>
+        </p:txBody>
+      </p:sp>
+      <p:sp>
+        <p:nvSpPr>
+          <p:cNvPr id="4" name="Cím 1">
+            <a:extLst>
+              <a:ext uri="{FF2B5EF4-FFF2-40B4-BE49-F238E27FC236}">
+                <a16:creationId xmlns:a16="http://schemas.microsoft.com/office/drawing/2014/main" id="{BB6A1BE4-74F4-4139-946B-D5B786B12430}"/>
+              </a:ext>
+            </a:extLst>
+          </p:cNvPr>
+          <p:cNvSpPr txBox="1">
+            <a:spLocks/>
+          </p:cNvSpPr>
+          <p:nvPr/>
+        </p:nvSpPr>
+        <p:spPr>
+          <a:xfrm>
+            <a:off x="1524000" y="487486"/>
+            <a:ext cx="9144000" cy="847114"/>
+          </a:xfrm>
+          <a:prstGeom prst="rect">
+            <a:avLst/>
+          </a:prstGeom>
+          <a:ln>
+            <a:noFill/>
+          </a:ln>
+        </p:spPr>
+        <p:txBody>
+          <a:bodyPr vert="horz" lIns="91440" tIns="45720" rIns="91440" bIns="45720" rtlCol="0" anchor="ctr">
+            <a:normAutofit fontScale="90000" lnSpcReduction="10000"/>
+          </a:bodyPr>
+          <a:lstStyle>
+            <a:lvl1pPr algn="l" defTabSz="914400" rtl="0" eaLnBrk="1" latinLnBrk="0" hangingPunct="1">
+              <a:lnSpc>
+                <a:spcPct val="90000"/>
+              </a:lnSpc>
+              <a:spcBef>
+                <a:spcPct val="0"/>
+              </a:spcBef>
+              <a:buNone/>
+              <a:defRPr sz="4400" kern="1200">
+                <a:solidFill>
+                  <a:schemeClr val="tx1"/>
+                </a:solidFill>
+                <a:latin typeface="+mj-lt"/>
+                <a:ea typeface="+mj-ea"/>
+                <a:cs typeface="+mj-cs"/>
+              </a:defRPr>
+            </a:lvl1pPr>
+          </a:lstStyle>
+          <a:p>
+            <a:pPr marL="0" lvl="1">
+              <a:defRPr/>
+            </a:pPr>
+            <a:r>
+              <a:rPr lang="hu-HU" sz="6000" kern="0" dirty="0">
+                <a:solidFill>
+                  <a:schemeClr val="tx1">
+                    <a:lumMod val="75000"/>
+                    <a:lumOff val="25000"/>
+                  </a:schemeClr>
+                </a:solidFill>
+                <a:latin typeface="Arial" panose="020B0604020202020204" pitchFamily="34" charset="0"/>
+                <a:cs typeface="Arial" panose="020B0604020202020204" pitchFamily="34" charset="0"/>
+              </a:rPr>
+              <a:t>	               </a:t>
+            </a:r>
+            <a:r>
+              <a:rPr lang="hu-HU" sz="5400" dirty="0" err="1"/>
+              <a:t>Our</a:t>
+            </a:r>
+            <a:r>
+              <a:rPr lang="hu-HU" sz="5400" dirty="0"/>
+              <a:t> shop</a:t>
+            </a:r>
+            <a:endParaRPr lang="en-GB" sz="5400" dirty="0"/>
+          </a:p>
+        </p:txBody>
+      </p:sp>
+      <p:cxnSp>
+        <p:nvCxnSpPr>
+          <p:cNvPr id="5" name="Egyenes összekötő 4">
+            <a:extLst>
+              <a:ext uri="{FF2B5EF4-FFF2-40B4-BE49-F238E27FC236}">
+                <a16:creationId xmlns:a16="http://schemas.microsoft.com/office/drawing/2014/main" id="{F56988C3-69C4-4421-9F78-FC61B75C905C}"/>
+              </a:ext>
+            </a:extLst>
+          </p:cNvPr>
+          <p:cNvCxnSpPr>
+            <a:cxnSpLocks/>
+          </p:cNvCxnSpPr>
+          <p:nvPr/>
+        </p:nvCxnSpPr>
+        <p:spPr>
+          <a:xfrm>
+            <a:off x="3357904" y="1316650"/>
+            <a:ext cx="5863472" cy="0"/>
+          </a:xfrm>
+          <a:prstGeom prst="line">
+            <a:avLst/>
+          </a:prstGeom>
+          <a:ln w="25400">
+            <a:solidFill>
+              <a:schemeClr val="tx1">
+                <a:lumMod val="50000"/>
+                <a:lumOff val="50000"/>
+              </a:schemeClr>
+            </a:solidFill>
+          </a:ln>
+        </p:spPr>
+        <p:style>
+          <a:lnRef idx="1">
+            <a:schemeClr val="accent1"/>
+          </a:lnRef>
+          <a:fillRef idx="0">
+            <a:schemeClr val="accent1"/>
+          </a:fillRef>
+          <a:effectRef idx="0">
+            <a:schemeClr val="accent1"/>
+          </a:effectRef>
+          <a:fontRef idx="minor">
+            <a:schemeClr val="tx1"/>
+          </a:fontRef>
+        </p:style>
+      </p:cxnSp>
+      <p:sp>
+        <p:nvSpPr>
+          <p:cNvPr id="6" name="Tartalom helye 2">
+            <a:extLst>
+              <a:ext uri="{FF2B5EF4-FFF2-40B4-BE49-F238E27FC236}">
+                <a16:creationId xmlns:a16="http://schemas.microsoft.com/office/drawing/2014/main" id="{0A7BCA7C-42FB-4240-A145-2F6FFCBA8E1A}"/>
+              </a:ext>
+            </a:extLst>
+          </p:cNvPr>
+          <p:cNvSpPr txBox="1">
+            <a:spLocks/>
+          </p:cNvSpPr>
+          <p:nvPr/>
+        </p:nvSpPr>
+        <p:spPr>
+          <a:xfrm>
+            <a:off x="2489164" y="1690688"/>
+            <a:ext cx="7600951" cy="2101726"/>
+          </a:xfrm>
+          <a:prstGeom prst="rect">
+            <a:avLst/>
+          </a:prstGeom>
+        </p:spPr>
+        <p:txBody>
+          <a:bodyPr vert="horz" lIns="91440" tIns="45720" rIns="91440" bIns="45720" rtlCol="0">
+            <a:normAutofit/>
+          </a:bodyPr>
+          <a:lstStyle>
+            <a:lvl1pPr marL="228600" indent="-228600" algn="l" defTabSz="914400" rtl="0" eaLnBrk="1" latinLnBrk="0" hangingPunct="1">
+              <a:lnSpc>
+                <a:spcPct val="90000"/>
+              </a:lnSpc>
+              <a:spcBef>
+                <a:spcPts val="1000"/>
+              </a:spcBef>
+              <a:buFont typeface="Arial" panose="020B0604020202020204" pitchFamily="34" charset="0"/>
+              <a:buChar char="•"/>
+              <a:defRPr sz="2800" kern="1200">
+                <a:solidFill>
+                  <a:schemeClr val="tx1"/>
+                </a:solidFill>
+                <a:latin typeface="+mn-lt"/>
+                <a:ea typeface="+mn-ea"/>
+                <a:cs typeface="+mn-cs"/>
+              </a:defRPr>
+            </a:lvl1pPr>
+            <a:lvl2pPr marL="685800" indent="-228600" algn="l" defTabSz="914400" rtl="0" eaLnBrk="1" latinLnBrk="0" hangingPunct="1">
+              <a:lnSpc>
+                <a:spcPct val="90000"/>
+              </a:lnSpc>
+              <a:spcBef>
+                <a:spcPts val="500"/>
+              </a:spcBef>
+              <a:buFont typeface="Arial" panose="020B0604020202020204" pitchFamily="34" charset="0"/>
+              <a:buChar char="•"/>
+              <a:defRPr sz="2400" kern="1200">
+                <a:solidFill>
+                  <a:schemeClr val="tx1"/>
+                </a:solidFill>
+                <a:latin typeface="+mn-lt"/>
+                <a:ea typeface="+mn-ea"/>
+                <a:cs typeface="+mn-cs"/>
+              </a:defRPr>
+            </a:lvl2pPr>
+            <a:lvl3pPr marL="1143000" indent="-228600" algn="l" defTabSz="914400" rtl="0" eaLnBrk="1" latinLnBrk="0" hangingPunct="1">
+              <a:lnSpc>
+                <a:spcPct val="90000"/>
+              </a:lnSpc>
+              <a:spcBef>
+                <a:spcPts val="500"/>
+              </a:spcBef>
+              <a:buFont typeface="Arial" panose="020B0604020202020204" pitchFamily="34" charset="0"/>
+              <a:buChar char="•"/>
+              <a:defRPr sz="2000" kern="1200">
+                <a:solidFill>
+                  <a:schemeClr val="tx1"/>
+                </a:solidFill>
+                <a:latin typeface="+mn-lt"/>
+                <a:ea typeface="+mn-ea"/>
+                <a:cs typeface="+mn-cs"/>
+              </a:defRPr>
+            </a:lvl3pPr>
+            <a:lvl4pPr marL="1600200" indent="-228600" algn="l" defTabSz="914400" rtl="0" eaLnBrk="1" latinLnBrk="0" hangingPunct="1">
+              <a:lnSpc>
+                <a:spcPct val="90000"/>
+              </a:lnSpc>
+              <a:spcBef>
+                <a:spcPts val="500"/>
+              </a:spcBef>
+              <a:buFont typeface="Arial" panose="020B0604020202020204" pitchFamily="34" charset="0"/>
+              <a:buChar char="•"/>
+              <a:defRPr sz="1800" kern="1200">
+                <a:solidFill>
+                  <a:schemeClr val="tx1"/>
+                </a:solidFill>
+                <a:latin typeface="+mn-lt"/>
+                <a:ea typeface="+mn-ea"/>
+                <a:cs typeface="+mn-cs"/>
+              </a:defRPr>
+            </a:lvl4pPr>
+            <a:lvl5pPr marL="2057400" indent="-228600" algn="l" defTabSz="914400" rtl="0" eaLnBrk="1" latinLnBrk="0" hangingPunct="1">
+              <a:lnSpc>
+                <a:spcPct val="90000"/>
+              </a:lnSpc>
+              <a:spcBef>
+                <a:spcPts val="500"/>
+              </a:spcBef>
+              <a:buFont typeface="Arial" panose="020B0604020202020204" pitchFamily="34" charset="0"/>
+              <a:buChar char="•"/>
+              <a:defRPr sz="1800" kern="1200">
+                <a:solidFill>
+                  <a:schemeClr val="tx1"/>
+                </a:solidFill>
+                <a:latin typeface="+mn-lt"/>
+                <a:ea typeface="+mn-ea"/>
+                <a:cs typeface="+mn-cs"/>
+              </a:defRPr>
+            </a:lvl5pPr>
+            <a:lvl6pPr marL="2514600" indent="-228600" algn="l" defTabSz="914400" rtl="0" eaLnBrk="1" latinLnBrk="0" hangingPunct="1">
+              <a:lnSpc>
+                <a:spcPct val="90000"/>
+              </a:lnSpc>
+              <a:spcBef>
+                <a:spcPts val="500"/>
+              </a:spcBef>
+              <a:buFont typeface="Arial" panose="020B0604020202020204" pitchFamily="34" charset="0"/>
+              <a:buChar char="•"/>
+              <a:defRPr sz="1800" kern="1200">
+                <a:solidFill>
+                  <a:schemeClr val="tx1"/>
+                </a:solidFill>
+                <a:latin typeface="+mn-lt"/>
+                <a:ea typeface="+mn-ea"/>
+                <a:cs typeface="+mn-cs"/>
+              </a:defRPr>
+            </a:lvl6pPr>
+            <a:lvl7pPr marL="2971800" indent="-228600" algn="l" defTabSz="914400" rtl="0" eaLnBrk="1" latinLnBrk="0" hangingPunct="1">
+              <a:lnSpc>
+                <a:spcPct val="90000"/>
+              </a:lnSpc>
+              <a:spcBef>
+                <a:spcPts val="500"/>
+              </a:spcBef>
+              <a:buFont typeface="Arial" panose="020B0604020202020204" pitchFamily="34" charset="0"/>
+              <a:buChar char="•"/>
+              <a:defRPr sz="1800" kern="1200">
+                <a:solidFill>
+                  <a:schemeClr val="tx1"/>
+                </a:solidFill>
+                <a:latin typeface="+mn-lt"/>
+                <a:ea typeface="+mn-ea"/>
+                <a:cs typeface="+mn-cs"/>
+              </a:defRPr>
+            </a:lvl7pPr>
+            <a:lvl8pPr marL="3429000" indent="-228600" algn="l" defTabSz="914400" rtl="0" eaLnBrk="1" latinLnBrk="0" hangingPunct="1">
+              <a:lnSpc>
+                <a:spcPct val="90000"/>
+              </a:lnSpc>
+              <a:spcBef>
+                <a:spcPts val="500"/>
+              </a:spcBef>
+              <a:buFont typeface="Arial" panose="020B0604020202020204" pitchFamily="34" charset="0"/>
+              <a:buChar char="•"/>
+              <a:defRPr sz="1800" kern="1200">
+                <a:solidFill>
+                  <a:schemeClr val="tx1"/>
+                </a:solidFill>
+                <a:latin typeface="+mn-lt"/>
+                <a:ea typeface="+mn-ea"/>
+                <a:cs typeface="+mn-cs"/>
+              </a:defRPr>
+            </a:lvl8pPr>
+            <a:lvl9pPr marL="3886200" indent="-228600" algn="l" defTabSz="914400" rtl="0" eaLnBrk="1" latinLnBrk="0" hangingPunct="1">
+              <a:lnSpc>
+                <a:spcPct val="90000"/>
+              </a:lnSpc>
+              <a:spcBef>
+                <a:spcPts val="500"/>
+              </a:spcBef>
+              <a:buFont typeface="Arial" panose="020B0604020202020204" pitchFamily="34" charset="0"/>
+              <a:buChar char="•"/>
+              <a:defRPr sz="1800" kern="1200">
+                <a:solidFill>
+                  <a:schemeClr val="tx1"/>
+                </a:solidFill>
+                <a:latin typeface="+mn-lt"/>
+                <a:ea typeface="+mn-ea"/>
+                <a:cs typeface="+mn-cs"/>
+              </a:defRPr>
+            </a:lvl9pPr>
+          </a:lstStyle>
+          <a:p>
+            <a:pPr marL="0" indent="0" algn="ctr">
+              <a:buNone/>
+            </a:pPr>
+            <a:r>
+              <a:rPr lang="hu-HU" sz="2000" dirty="0"/>
+              <a:t>The NASAPC </a:t>
+            </a:r>
+            <a:r>
+              <a:rPr lang="hu-HU" sz="2000" dirty="0" err="1"/>
+              <a:t>offers</a:t>
+            </a:r>
+            <a:r>
+              <a:rPr lang="hu-HU" sz="2000" dirty="0"/>
+              <a:t> a </a:t>
+            </a:r>
+            <a:r>
+              <a:rPr lang="hu-HU" sz="2000" dirty="0" err="1"/>
+              <a:t>highly</a:t>
+            </a:r>
+            <a:r>
+              <a:rPr lang="hu-HU" sz="2000" dirty="0"/>
+              <a:t> </a:t>
+            </a:r>
+            <a:r>
+              <a:rPr lang="hu-HU" sz="2000" dirty="0" err="1"/>
+              <a:t>scalable</a:t>
+            </a:r>
+            <a:r>
+              <a:rPr lang="hu-HU" sz="2000" dirty="0"/>
+              <a:t> platform </a:t>
+            </a:r>
+            <a:r>
+              <a:rPr lang="hu-HU" sz="2000" dirty="0" err="1"/>
+              <a:t>for</a:t>
+            </a:r>
+            <a:r>
+              <a:rPr lang="hu-HU" sz="2000" dirty="0"/>
+              <a:t> an </a:t>
+            </a:r>
+            <a:r>
+              <a:rPr lang="hu-HU" sz="2000" dirty="0" err="1"/>
+              <a:t>actual</a:t>
+            </a:r>
+            <a:endParaRPr lang="hu-HU" sz="2000" dirty="0"/>
+          </a:p>
+          <a:p>
+            <a:pPr marL="0" indent="0" algn="ctr">
+              <a:buNone/>
+            </a:pPr>
+            <a:r>
+              <a:rPr lang="hu-HU" sz="2000" dirty="0"/>
+              <a:t>webshop </a:t>
+            </a:r>
+            <a:r>
+              <a:rPr lang="hu-HU" sz="2000" dirty="0" err="1"/>
+              <a:t>capable</a:t>
+            </a:r>
+            <a:r>
+              <a:rPr lang="hu-HU" sz="2000" dirty="0"/>
+              <a:t> of </a:t>
+            </a:r>
+            <a:r>
+              <a:rPr lang="hu-HU" sz="2000" dirty="0" err="1"/>
+              <a:t>fulfilling</a:t>
+            </a:r>
+            <a:r>
+              <a:rPr lang="hu-HU" sz="2000" dirty="0"/>
+              <a:t> </a:t>
+            </a:r>
+            <a:r>
+              <a:rPr lang="hu-HU" sz="2000" dirty="0" err="1"/>
+              <a:t>every</a:t>
+            </a:r>
+            <a:r>
+              <a:rPr lang="hu-HU" sz="2000" dirty="0"/>
+              <a:t> </a:t>
+            </a:r>
+            <a:r>
+              <a:rPr lang="hu-HU" sz="2000" dirty="0" err="1"/>
+              <a:t>function</a:t>
+            </a:r>
+            <a:r>
+              <a:rPr lang="hu-HU" sz="2000" dirty="0"/>
+              <a:t> a modern webshop </a:t>
+            </a:r>
+            <a:r>
+              <a:rPr lang="hu-HU" sz="2000" dirty="0" err="1"/>
+              <a:t>should</a:t>
+            </a:r>
+            <a:endParaRPr lang="hu-HU" sz="2000" dirty="0"/>
+          </a:p>
+          <a:p>
+            <a:pPr marL="0" indent="0" algn="ctr">
+              <a:buNone/>
+            </a:pPr>
+            <a:r>
+              <a:rPr lang="hu-HU" sz="2000" dirty="0" err="1"/>
+              <a:t>have</a:t>
+            </a:r>
+            <a:r>
+              <a:rPr lang="hu-HU" sz="2000" dirty="0"/>
+              <a:t> and more, </a:t>
+            </a:r>
+            <a:r>
+              <a:rPr lang="hu-HU" sz="2000" dirty="0" err="1"/>
+              <a:t>on</a:t>
+            </a:r>
+            <a:r>
+              <a:rPr lang="hu-HU" sz="2000" dirty="0"/>
+              <a:t> top of </a:t>
+            </a:r>
+            <a:r>
+              <a:rPr lang="hu-HU" sz="2000" dirty="0" err="1"/>
+              <a:t>providing</a:t>
+            </a:r>
+            <a:r>
+              <a:rPr lang="hu-HU" sz="2000" dirty="0"/>
+              <a:t> a </a:t>
+            </a:r>
+            <a:r>
+              <a:rPr lang="hu-HU" sz="2000" dirty="0" err="1"/>
+              <a:t>great</a:t>
+            </a:r>
+            <a:r>
+              <a:rPr lang="hu-HU" sz="2000" dirty="0"/>
+              <a:t> consumer </a:t>
+            </a:r>
+            <a:r>
+              <a:rPr lang="hu-HU" sz="2000" dirty="0" err="1"/>
+              <a:t>experience</a:t>
+            </a:r>
+            <a:r>
+              <a:rPr lang="hu-HU" sz="2000" dirty="0"/>
+              <a:t>.</a:t>
+            </a:r>
+          </a:p>
+          <a:p>
+            <a:endParaRPr lang="hu-HU" sz="2000" dirty="0"/>
+          </a:p>
+          <a:p>
+            <a:pPr marL="0" indent="0" algn="ctr">
+              <a:buNone/>
+            </a:pPr>
+            <a:r>
+              <a:rPr lang="hu-HU" sz="2000" dirty="0" err="1"/>
+              <a:t>This</a:t>
+            </a:r>
+            <a:r>
+              <a:rPr lang="hu-HU" sz="2000" dirty="0"/>
+              <a:t> is </a:t>
+            </a:r>
+            <a:r>
+              <a:rPr lang="hu-HU" sz="2000" dirty="0" err="1"/>
+              <a:t>how</a:t>
+            </a:r>
+            <a:r>
+              <a:rPr lang="hu-HU" sz="2000" dirty="0"/>
+              <a:t>:</a:t>
+            </a:r>
+          </a:p>
+          <a:p>
+            <a:pPr marL="914400" lvl="2" indent="0" algn="ctr">
+              <a:buNone/>
+            </a:pPr>
+            <a:endParaRPr lang="hu-HU" sz="1200" dirty="0"/>
+          </a:p>
+        </p:txBody>
+      </p:sp>
+    </p:spTree>
+    <p:extLst>
+      <p:ext uri="{BB962C8B-B14F-4D97-AF65-F5344CB8AC3E}">
+        <p14:creationId xmlns:p14="http://schemas.microsoft.com/office/powerpoint/2010/main" val="60404238"/>
+      </p:ext>
+    </p:extLst>
+  </p:cSld>
+  <p:clrMapOvr>
+    <a:masterClrMapping/>
+  </p:clrMapOvr>
+</p:sld>
+</file>
+
+<file path=ppt/slides/slide4.xml><?xml version="1.0" encoding="utf-8"?>
+<p:sld xmlns:a="http://schemas.openxmlformats.org/drawingml/2006/main" xmlns:r="http://schemas.openxmlformats.org/officeDocument/2006/relationships" xmlns:p="http://schemas.openxmlformats.org/presentationml/2006/main">
+  <p:cSld>
+    <p:spTree>
+      <p:nvGrpSpPr>
+        <p:cNvPr id="1" name=""/>
+        <p:cNvGrpSpPr/>
+        <p:nvPr/>
+      </p:nvGrpSpPr>
+      <p:grpSpPr>
+        <a:xfrm>
+          <a:off x="0" y="0"/>
+          <a:ext cx="0" cy="0"/>
+          <a:chOff x="0" y="0"/>
+          <a:chExt cx="0" cy="0"/>
+        </a:xfrm>
+      </p:grpSpPr>
+      <p:sp>
+        <p:nvSpPr>
+          <p:cNvPr id="2" name="Cím 1">
+            <a:extLst>
+              <a:ext uri="{FF2B5EF4-FFF2-40B4-BE49-F238E27FC236}">
                 <a16:creationId xmlns:a16="http://schemas.microsoft.com/office/drawing/2014/main" id="{C37C21C9-7C9C-4C95-BE06-301051055663}"/>
               </a:ext>
             </a:extLst>
@@ -5172,7 +6707,7 @@
 </p:sld>
 </file>
 
-<file path=ppt/slides/slide3.xml><?xml version="1.0" encoding="utf-8"?>
+<file path=ppt/slides/slide5.xml><?xml version="1.0" encoding="utf-8"?>
 <p:sld xmlns:a="http://schemas.openxmlformats.org/drawingml/2006/main" xmlns:r="http://schemas.openxmlformats.org/officeDocument/2006/relationships" xmlns:p="http://schemas.openxmlformats.org/presentationml/2006/main">
   <p:cSld>
     <p:spTree>
@@ -5837,7 +7372,7 @@
 </p:sld>
 </file>
 
-<file path=ppt/slides/slide4.xml><?xml version="1.0" encoding="utf-8"?>
+<file path=ppt/slides/slide6.xml><?xml version="1.0" encoding="utf-8"?>
 <p:sld xmlns:a="http://schemas.openxmlformats.org/drawingml/2006/main" xmlns:r="http://schemas.openxmlformats.org/officeDocument/2006/relationships" xmlns:p="http://schemas.openxmlformats.org/presentationml/2006/main">
   <p:cSld>
     <p:spTree>
@@ -6378,7 +7913,7 @@
 </p:sld>
 </file>
 
-<file path=ppt/slides/slide5.xml><?xml version="1.0" encoding="utf-8"?>
+<file path=ppt/slides/slide7.xml><?xml version="1.0" encoding="utf-8"?>
 <p:sld xmlns:a="http://schemas.openxmlformats.org/drawingml/2006/main" xmlns:r="http://schemas.openxmlformats.org/officeDocument/2006/relationships" xmlns:p="http://schemas.openxmlformats.org/presentationml/2006/main">
   <p:cSld>
     <p:spTree>
@@ -6937,7 +8472,7 @@
 </p:sld>
 </file>
 
-<file path=ppt/slides/slide6.xml><?xml version="1.0" encoding="utf-8"?>
+<file path=ppt/slides/slide8.xml><?xml version="1.0" encoding="utf-8"?>
 <p:sld xmlns:a="http://schemas.openxmlformats.org/drawingml/2006/main" xmlns:r="http://schemas.openxmlformats.org/officeDocument/2006/relationships" xmlns:p="http://schemas.openxmlformats.org/presentationml/2006/main">
   <p:cSld>
     <p:spTree>
@@ -7237,7 +8772,7 @@
 </p:sld>
 </file>
 
-<file path=ppt/slides/slide7.xml><?xml version="1.0" encoding="utf-8"?>
+<file path=ppt/slides/slide9.xml><?xml version="1.0" encoding="utf-8"?>
 <p:sld xmlns:a="http://schemas.openxmlformats.org/drawingml/2006/main" xmlns:r="http://schemas.openxmlformats.org/officeDocument/2006/relationships" xmlns:p="http://schemas.openxmlformats.org/presentationml/2006/main">
   <p:cSld>
     <p:spTree>

</xml_diff>